<commit_message>
Finished data prep and encoding, preformed some preliminary modeling. Next step is to upsample, select the best model, tune hyperparameters, and analyze.
</commit_message>
<xml_diff>
--- a/Presentation.pptx
+++ b/Presentation.pptx
@@ -116,6 +116,11 @@
       </a:defRPr>
     </a:lvl9pPr>
   </p:defaultTextStyle>
+  <p:extLst>
+    <p:ext uri="{EFAFB233-063F-42B5-8137-9DF3F51BA10A}">
+      <p15:sldGuideLst xmlns:p15="http://schemas.microsoft.com/office/powerpoint/2012/main"/>
+    </p:ext>
+  </p:extLst>
 </p:presentation>
 </file>
 
@@ -266,7 +271,7 @@
           <a:p>
             <a:fld id="{B7B5F161-9071-45B2-9F36-91F00C582948}" type="datetimeFigureOut">
               <a:rPr lang="en-US" smtClean="0"/>
-              <a:t>9/30/2021</a:t>
+              <a:t>10/6/2021</a:t>
             </a:fld>
             <a:endParaRPr lang="en-US"/>
           </a:p>
@@ -464,7 +469,7 @@
           <a:p>
             <a:fld id="{B7B5F161-9071-45B2-9F36-91F00C582948}" type="datetimeFigureOut">
               <a:rPr lang="en-US" smtClean="0"/>
-              <a:t>9/30/2021</a:t>
+              <a:t>10/6/2021</a:t>
             </a:fld>
             <a:endParaRPr lang="en-US"/>
           </a:p>
@@ -672,7 +677,7 @@
           <a:p>
             <a:fld id="{B7B5F161-9071-45B2-9F36-91F00C582948}" type="datetimeFigureOut">
               <a:rPr lang="en-US" smtClean="0"/>
-              <a:t>9/30/2021</a:t>
+              <a:t>10/6/2021</a:t>
             </a:fld>
             <a:endParaRPr lang="en-US"/>
           </a:p>
@@ -870,7 +875,7 @@
           <a:p>
             <a:fld id="{B7B5F161-9071-45B2-9F36-91F00C582948}" type="datetimeFigureOut">
               <a:rPr lang="en-US" smtClean="0"/>
-              <a:t>9/30/2021</a:t>
+              <a:t>10/6/2021</a:t>
             </a:fld>
             <a:endParaRPr lang="en-US"/>
           </a:p>
@@ -1145,7 +1150,7 @@
           <a:p>
             <a:fld id="{B7B5F161-9071-45B2-9F36-91F00C582948}" type="datetimeFigureOut">
               <a:rPr lang="en-US" smtClean="0"/>
-              <a:t>9/30/2021</a:t>
+              <a:t>10/6/2021</a:t>
             </a:fld>
             <a:endParaRPr lang="en-US"/>
           </a:p>
@@ -1410,7 +1415,7 @@
           <a:p>
             <a:fld id="{B7B5F161-9071-45B2-9F36-91F00C582948}" type="datetimeFigureOut">
               <a:rPr lang="en-US" smtClean="0"/>
-              <a:t>9/30/2021</a:t>
+              <a:t>10/6/2021</a:t>
             </a:fld>
             <a:endParaRPr lang="en-US"/>
           </a:p>
@@ -1822,7 +1827,7 @@
           <a:p>
             <a:fld id="{B7B5F161-9071-45B2-9F36-91F00C582948}" type="datetimeFigureOut">
               <a:rPr lang="en-US" smtClean="0"/>
-              <a:t>9/30/2021</a:t>
+              <a:t>10/6/2021</a:t>
             </a:fld>
             <a:endParaRPr lang="en-US"/>
           </a:p>
@@ -1963,7 +1968,7 @@
           <a:p>
             <a:fld id="{B7B5F161-9071-45B2-9F36-91F00C582948}" type="datetimeFigureOut">
               <a:rPr lang="en-US" smtClean="0"/>
-              <a:t>9/30/2021</a:t>
+              <a:t>10/6/2021</a:t>
             </a:fld>
             <a:endParaRPr lang="en-US"/>
           </a:p>
@@ -2076,7 +2081,7 @@
           <a:p>
             <a:fld id="{B7B5F161-9071-45B2-9F36-91F00C582948}" type="datetimeFigureOut">
               <a:rPr lang="en-US" smtClean="0"/>
-              <a:t>9/30/2021</a:t>
+              <a:t>10/6/2021</a:t>
             </a:fld>
             <a:endParaRPr lang="en-US"/>
           </a:p>
@@ -2387,7 +2392,7 @@
           <a:p>
             <a:fld id="{B7B5F161-9071-45B2-9F36-91F00C582948}" type="datetimeFigureOut">
               <a:rPr lang="en-US" smtClean="0"/>
-              <a:t>9/30/2021</a:t>
+              <a:t>10/6/2021</a:t>
             </a:fld>
             <a:endParaRPr lang="en-US"/>
           </a:p>
@@ -2675,7 +2680,7 @@
           <a:p>
             <a:fld id="{B7B5F161-9071-45B2-9F36-91F00C582948}" type="datetimeFigureOut">
               <a:rPr lang="en-US" smtClean="0"/>
-              <a:t>9/30/2021</a:t>
+              <a:t>10/6/2021</a:t>
             </a:fld>
             <a:endParaRPr lang="en-US"/>
           </a:p>
@@ -2916,7 +2921,7 @@
           <a:p>
             <a:fld id="{B7B5F161-9071-45B2-9F36-91F00C582948}" type="datetimeFigureOut">
               <a:rPr lang="en-US" smtClean="0"/>
-              <a:t>9/30/2021</a:t>
+              <a:t>10/6/2021</a:t>
             </a:fld>
             <a:endParaRPr lang="en-US"/>
           </a:p>
@@ -3597,7 +3602,10 @@
           <a:bodyPr/>
           <a:lstStyle/>
           <a:p>
-            <a:endParaRPr lang="en-US"/>
+            <a:r>
+              <a:rPr lang="en-US"/>
+              <a:t>Thoughts</a:t>
+            </a:r>
           </a:p>
         </p:txBody>
       </p:sp>
@@ -3622,7 +3630,13 @@
           <a:bodyPr/>
           <a:lstStyle/>
           <a:p>
-            <a:endParaRPr lang="en-US"/>
+            <a:r>
+              <a:rPr lang="en-US" dirty="0"/>
+              <a:t>sketchy providers make up most visits so we can have more false positives because they submit more so can be caught other ways...</a:t>
+            </a:r>
+          </a:p>
+          <a:p>
+            <a:endParaRPr lang="en-US" dirty="0"/>
           </a:p>
         </p:txBody>
       </p:sp>

</xml_diff>

<commit_message>
Final commit: all graphics updated, presentation finalized
</commit_message>
<xml_diff>
--- a/Presentation.pptx
+++ b/Presentation.pptx
@@ -5506,7 +5506,7 @@
           <a:p>
             <a:fld id="{96299155-8C15-4111-8F2A-1ED45D93EB7E}" type="datetimeFigureOut">
               <a:rPr lang="en-US" smtClean="0"/>
-              <a:t>10/15/2021</a:t>
+              <a:t>10/27/2021</a:t>
             </a:fld>
             <a:endParaRPr lang="en-US"/>
           </a:p>
@@ -5999,7 +5999,7 @@
           <a:p>
             <a:fld id="{6AD9D4C4-1B73-4C89-8E57-5C04E1D78C46}" type="datetime1">
               <a:rPr lang="en-US" smtClean="0"/>
-              <a:t>10/15/2021</a:t>
+              <a:t>10/27/2021</a:t>
             </a:fld>
             <a:endParaRPr lang="en-US"/>
           </a:p>
@@ -6207,7 +6207,7 @@
           <a:p>
             <a:fld id="{FE185BEE-3CA5-4787-88E9-2D6CC218F06A}" type="datetime1">
               <a:rPr lang="en-US" smtClean="0"/>
-              <a:t>10/15/2021</a:t>
+              <a:t>10/27/2021</a:t>
             </a:fld>
             <a:endParaRPr lang="en-US"/>
           </a:p>
@@ -6463,7 +6463,7 @@
           <a:p>
             <a:fld id="{042ED351-F275-4A77-8AB7-354B3BF9EA63}" type="datetime1">
               <a:rPr lang="en-US" smtClean="0"/>
-              <a:t>10/15/2021</a:t>
+              <a:t>10/27/2021</a:t>
             </a:fld>
             <a:endParaRPr lang="en-US"/>
           </a:p>
@@ -6633,7 +6633,7 @@
           <a:p>
             <a:fld id="{52B603BA-C32A-4F21-9787-03412F6F3505}" type="datetime1">
               <a:rPr lang="en-US" smtClean="0"/>
-              <a:t>10/15/2021</a:t>
+              <a:t>10/27/2021</a:t>
             </a:fld>
             <a:endParaRPr lang="en-US"/>
           </a:p>
@@ -6976,7 +6976,7 @@
           <a:p>
             <a:fld id="{E20AB7CC-7DC5-4546-A686-5B9BBB465C82}" type="datetime1">
               <a:rPr lang="en-US" smtClean="0"/>
-              <a:t>10/15/2021</a:t>
+              <a:t>10/27/2021</a:t>
             </a:fld>
             <a:endParaRPr lang="en-US"/>
           </a:p>
@@ -7251,7 +7251,7 @@
           <a:p>
             <a:fld id="{0E12B09E-B487-4950-B0B2-8813FA434184}" type="datetime1">
               <a:rPr lang="en-US" smtClean="0"/>
-              <a:t>10/15/2021</a:t>
+              <a:t>10/27/2021</a:t>
             </a:fld>
             <a:endParaRPr lang="en-US"/>
           </a:p>
@@ -7630,7 +7630,7 @@
           <a:p>
             <a:fld id="{7D1F39AA-A281-4BF8-A195-7FB76B0FFA95}" type="datetime1">
               <a:rPr lang="en-US" smtClean="0"/>
-              <a:t>10/15/2021</a:t>
+              <a:t>10/27/2021</a:t>
             </a:fld>
             <a:endParaRPr lang="en-US"/>
           </a:p>
@@ -7749,7 +7749,7 @@
           <a:p>
             <a:fld id="{1094FEE1-FF4C-44A4-B569-86077A571B7D}" type="datetime1">
               <a:rPr lang="en-US" smtClean="0"/>
-              <a:t>10/15/2021</a:t>
+              <a:t>10/27/2021</a:t>
             </a:fld>
             <a:endParaRPr lang="en-US"/>
           </a:p>
@@ -7920,7 +7920,7 @@
           <a:p>
             <a:fld id="{CCD08DA4-76FD-4B62-B0D3-9E3A679BFCBF}" type="datetime1">
               <a:rPr lang="en-US" smtClean="0"/>
-              <a:t>10/15/2021</a:t>
+              <a:t>10/27/2021</a:t>
             </a:fld>
             <a:endParaRPr lang="en-US"/>
           </a:p>
@@ -8274,7 +8274,7 @@
           <a:p>
             <a:fld id="{77976F81-728D-4C7F-B40A-DEA8A07CE1A3}" type="datetime1">
               <a:rPr lang="en-US" smtClean="0"/>
-              <a:t>10/15/2021</a:t>
+              <a:t>10/27/2021</a:t>
             </a:fld>
             <a:endParaRPr lang="en-US"/>
           </a:p>
@@ -8651,7 +8651,7 @@
           <a:p>
             <a:fld id="{AE1B2C51-E412-4C5F-94B2-2202DCC53029}" type="datetime1">
               <a:rPr lang="en-US" smtClean="0"/>
-              <a:t>10/15/2021</a:t>
+              <a:t>10/27/2021</a:t>
             </a:fld>
             <a:endParaRPr lang="en-US"/>
           </a:p>
@@ -8938,7 +8938,7 @@
           <a:p>
             <a:fld id="{7D1F39AA-A281-4BF8-A195-7FB76B0FFA95}" type="datetime1">
               <a:rPr lang="en-US" smtClean="0"/>
-              <a:t>10/15/2021</a:t>
+              <a:t>10/27/2021</a:t>
             </a:fld>
             <a:endParaRPr lang="en-US"/>
           </a:p>
@@ -10404,7 +10404,7 @@
         </p:nvGrpSpPr>
         <p:grpSpPr>
           <a:xfrm>
-            <a:off x="868844" y="1952724"/>
+            <a:off x="908033" y="1952724"/>
             <a:ext cx="10802444" cy="3600816"/>
             <a:chOff x="853640" y="2039028"/>
             <a:chExt cx="10802444" cy="3600816"/>
@@ -10643,78 +10643,99 @@
           </a:fontRef>
         </p:style>
       </p:cxnSp>
-      <p:pic>
-        <p:nvPicPr>
-          <p:cNvPr id="7" name="Picture 6" descr="Chart&#10;&#10;Description automatically generated">
+      <p:grpSp>
+        <p:nvGrpSpPr>
+          <p:cNvPr id="4" name="Group 3">
             <a:extLst>
               <a:ext uri="{FF2B5EF4-FFF2-40B4-BE49-F238E27FC236}">
-                <a16:creationId xmlns:a16="http://schemas.microsoft.com/office/drawing/2014/main" id="{D2C8EC6D-68B3-4143-9C02-09FB70409C5F}"/>
+                <a16:creationId xmlns:a16="http://schemas.microsoft.com/office/drawing/2014/main" id="{4DB3AFCE-CC94-4ADD-B57F-652CBF3AA5EC}"/>
               </a:ext>
             </a:extLst>
           </p:cNvPr>
-          <p:cNvPicPr>
-            <a:picLocks noChangeAspect="1"/>
-          </p:cNvPicPr>
+          <p:cNvGrpSpPr/>
           <p:nvPr/>
-        </p:nvPicPr>
-        <p:blipFill>
-          <a:blip r:embed="rId2">
-            <a:extLst>
-              <a:ext uri="{28A0092B-C50C-407E-A947-70E740481C1C}">
-                <a14:useLocalDpi xmlns:a14="http://schemas.microsoft.com/office/drawing/2010/main" val="0"/>
-              </a:ext>
-            </a:extLst>
-          </a:blip>
-          <a:stretch>
-            <a:fillRect/>
-          </a:stretch>
-        </p:blipFill>
-        <p:spPr>
+        </p:nvGrpSpPr>
+        <p:grpSpPr>
           <a:xfrm>
             <a:off x="1097280" y="1673479"/>
-            <a:ext cx="5327588" cy="3551726"/>
+            <a:ext cx="10551652" cy="3594714"/>
+            <a:chOff x="1097280" y="1673479"/>
+            <a:chExt cx="10551652" cy="3594714"/>
           </a:xfrm>
-          <a:prstGeom prst="rect">
-            <a:avLst/>
-          </a:prstGeom>
-        </p:spPr>
-      </p:pic>
-      <p:pic>
-        <p:nvPicPr>
-          <p:cNvPr id="8" name="Picture 7" descr="Chart&#10;&#10;Description automatically generated">
-            <a:extLst>
-              <a:ext uri="{FF2B5EF4-FFF2-40B4-BE49-F238E27FC236}">
-                <a16:creationId xmlns:a16="http://schemas.microsoft.com/office/drawing/2014/main" id="{28870E1A-AB60-4850-803C-CD4D748A1452}"/>
-              </a:ext>
-            </a:extLst>
-          </p:cNvPr>
-          <p:cNvPicPr>
-            <a:picLocks noChangeAspect="1"/>
-          </p:cNvPicPr>
-          <p:nvPr/>
-        </p:nvPicPr>
-        <p:blipFill>
-          <a:blip r:embed="rId3">
-            <a:extLst>
-              <a:ext uri="{28A0092B-C50C-407E-A947-70E740481C1C}">
-                <a14:useLocalDpi xmlns:a14="http://schemas.microsoft.com/office/drawing/2010/main" val="0"/>
-              </a:ext>
-            </a:extLst>
-          </a:blip>
-          <a:stretch>
-            <a:fillRect/>
-          </a:stretch>
-        </p:blipFill>
-        <p:spPr>
-          <a:xfrm>
-            <a:off x="6259081" y="1674958"/>
-            <a:ext cx="5389851" cy="3593235"/>
-          </a:xfrm>
-          <a:prstGeom prst="rect">
-            <a:avLst/>
-          </a:prstGeom>
-        </p:spPr>
-      </p:pic>
+        </p:grpSpPr>
+        <p:pic>
+          <p:nvPicPr>
+            <p:cNvPr id="7" name="Picture 6" descr="Chart&#10;&#10;Description automatically generated">
+              <a:extLst>
+                <a:ext uri="{FF2B5EF4-FFF2-40B4-BE49-F238E27FC236}">
+                  <a16:creationId xmlns:a16="http://schemas.microsoft.com/office/drawing/2014/main" id="{D2C8EC6D-68B3-4143-9C02-09FB70409C5F}"/>
+                </a:ext>
+              </a:extLst>
+            </p:cNvPr>
+            <p:cNvPicPr>
+              <a:picLocks noChangeAspect="1"/>
+            </p:cNvPicPr>
+            <p:nvPr/>
+          </p:nvPicPr>
+          <p:blipFill>
+            <a:blip r:embed="rId2">
+              <a:extLst>
+                <a:ext uri="{28A0092B-C50C-407E-A947-70E740481C1C}">
+                  <a14:useLocalDpi xmlns:a14="http://schemas.microsoft.com/office/drawing/2010/main" val="0"/>
+                </a:ext>
+              </a:extLst>
+            </a:blip>
+            <a:stretch>
+              <a:fillRect/>
+            </a:stretch>
+          </p:blipFill>
+          <p:spPr>
+            <a:xfrm>
+              <a:off x="1097280" y="1673479"/>
+              <a:ext cx="5327588" cy="3551726"/>
+            </a:xfrm>
+            <a:prstGeom prst="rect">
+              <a:avLst/>
+            </a:prstGeom>
+          </p:spPr>
+        </p:pic>
+        <p:pic>
+          <p:nvPicPr>
+            <p:cNvPr id="8" name="Picture 7" descr="Chart&#10;&#10;Description automatically generated">
+              <a:extLst>
+                <a:ext uri="{FF2B5EF4-FFF2-40B4-BE49-F238E27FC236}">
+                  <a16:creationId xmlns:a16="http://schemas.microsoft.com/office/drawing/2014/main" id="{28870E1A-AB60-4850-803C-CD4D748A1452}"/>
+                </a:ext>
+              </a:extLst>
+            </p:cNvPr>
+            <p:cNvPicPr>
+              <a:picLocks noChangeAspect="1"/>
+            </p:cNvPicPr>
+            <p:nvPr/>
+          </p:nvPicPr>
+          <p:blipFill>
+            <a:blip r:embed="rId3">
+              <a:extLst>
+                <a:ext uri="{28A0092B-C50C-407E-A947-70E740481C1C}">
+                  <a14:useLocalDpi xmlns:a14="http://schemas.microsoft.com/office/drawing/2010/main" val="0"/>
+                </a:ext>
+              </a:extLst>
+            </a:blip>
+            <a:stretch>
+              <a:fillRect/>
+            </a:stretch>
+          </p:blipFill>
+          <p:spPr>
+            <a:xfrm>
+              <a:off x="6259081" y="1674958"/>
+              <a:ext cx="5389851" cy="3593235"/>
+            </a:xfrm>
+            <a:prstGeom prst="rect">
+              <a:avLst/>
+            </a:prstGeom>
+          </p:spPr>
+        </p:pic>
+      </p:grpSp>
     </p:spTree>
     <p:extLst>
       <p:ext uri="{BB962C8B-B14F-4D97-AF65-F5344CB8AC3E}">
@@ -17173,7 +17194,7 @@
         </p:blipFill>
         <p:spPr>
           <a:xfrm>
-            <a:off x="5216637" y="1960094"/>
+            <a:off x="5118964" y="2177963"/>
             <a:ext cx="6591772" cy="3295886"/>
           </a:xfrm>
           <a:prstGeom prst="rect">
@@ -19035,225 +19056,256 @@
           </a:fontRef>
         </p:style>
       </p:cxnSp>
-      <p:pic>
-        <p:nvPicPr>
-          <p:cNvPr id="9" name="Picture 8" descr="A picture containing building&#10;&#10;Description automatically generated">
+      <p:grpSp>
+        <p:nvGrpSpPr>
+          <p:cNvPr id="8" name="Group 7">
             <a:extLst>
               <a:ext uri="{FF2B5EF4-FFF2-40B4-BE49-F238E27FC236}">
-                <a16:creationId xmlns:a16="http://schemas.microsoft.com/office/drawing/2014/main" id="{B655463C-E8A7-495D-AD16-E98D94BA8485}"/>
+                <a16:creationId xmlns:a16="http://schemas.microsoft.com/office/drawing/2014/main" id="{9F67187D-E618-4721-BD68-065015DF48F7}"/>
               </a:ext>
             </a:extLst>
           </p:cNvPr>
-          <p:cNvPicPr>
-            <a:picLocks noChangeAspect="1"/>
-          </p:cNvPicPr>
+          <p:cNvGrpSpPr/>
           <p:nvPr/>
-        </p:nvPicPr>
-        <p:blipFill>
-          <a:blip r:embed="rId2">
-            <a:extLst>
-              <a:ext uri="{28A0092B-C50C-407E-A947-70E740481C1C}">
-                <a14:useLocalDpi xmlns:a14="http://schemas.microsoft.com/office/drawing/2010/main" val="0"/>
-              </a:ext>
-            </a:extLst>
-          </a:blip>
-          <a:stretch>
-            <a:fillRect/>
-          </a:stretch>
-        </p:blipFill>
-        <p:spPr>
+        </p:nvGrpSpPr>
+        <p:grpSpPr>
           <a:xfrm>
-            <a:off x="6343548" y="1796213"/>
-            <a:ext cx="4346207" cy="4346207"/>
+            <a:off x="849132" y="1273708"/>
+            <a:ext cx="9451612" cy="4885388"/>
+            <a:chOff x="849132" y="1273708"/>
+            <a:chExt cx="9451612" cy="4885388"/>
           </a:xfrm>
-          <a:prstGeom prst="rect">
-            <a:avLst/>
-          </a:prstGeom>
-        </p:spPr>
-      </p:pic>
-      <p:sp>
-        <p:nvSpPr>
-          <p:cNvPr id="10" name="TextBox 9">
-            <a:extLst>
-              <a:ext uri="{FF2B5EF4-FFF2-40B4-BE49-F238E27FC236}">
-                <a16:creationId xmlns:a16="http://schemas.microsoft.com/office/drawing/2014/main" id="{00A54A29-F17E-454F-BC31-9F451A936B04}"/>
-              </a:ext>
-            </a:extLst>
-          </p:cNvPr>
-          <p:cNvSpPr txBox="1"/>
-          <p:nvPr/>
-        </p:nvSpPr>
-        <p:spPr>
-          <a:xfrm>
-            <a:off x="6923105" y="1247962"/>
-            <a:ext cx="3187091" cy="400110"/>
-          </a:xfrm>
-          <a:prstGeom prst="rect">
-            <a:avLst/>
-          </a:prstGeom>
-          <a:noFill/>
-        </p:spPr>
-        <p:txBody>
-          <a:bodyPr wrap="none" rtlCol="0">
-            <a:spAutoFit/>
-          </a:bodyPr>
-          <a:lstStyle/>
-          <a:p>
-            <a:r>
-              <a:rPr lang="en-US" sz="2000" dirty="0"/>
-              <a:t>Providers Labeled as Suspect</a:t>
-            </a:r>
-          </a:p>
-        </p:txBody>
-      </p:sp>
-      <p:pic>
-        <p:nvPicPr>
-          <p:cNvPr id="7" name="Picture 6" descr="Shape&#10;&#10;Description automatically generated">
-            <a:extLst>
-              <a:ext uri="{FF2B5EF4-FFF2-40B4-BE49-F238E27FC236}">
-                <a16:creationId xmlns:a16="http://schemas.microsoft.com/office/drawing/2014/main" id="{2D5CBBF0-9573-4481-8359-F6D62258D992}"/>
-              </a:ext>
-            </a:extLst>
-          </p:cNvPr>
-          <p:cNvPicPr>
-            <a:picLocks noChangeAspect="1"/>
-          </p:cNvPicPr>
-          <p:nvPr/>
-        </p:nvPicPr>
-        <p:blipFill>
-          <a:blip r:embed="rId3">
-            <a:extLst>
-              <a:ext uri="{28A0092B-C50C-407E-A947-70E740481C1C}">
-                <a14:useLocalDpi xmlns:a14="http://schemas.microsoft.com/office/drawing/2010/main" val="0"/>
-              </a:ext>
-            </a:extLst>
-          </a:blip>
-          <a:stretch>
-            <a:fillRect/>
-          </a:stretch>
-        </p:blipFill>
-        <p:spPr>
-          <a:xfrm>
-            <a:off x="1434162" y="1744805"/>
-            <a:ext cx="4414291" cy="4414291"/>
-          </a:xfrm>
-          <a:prstGeom prst="rect">
-            <a:avLst/>
-          </a:prstGeom>
-        </p:spPr>
-      </p:pic>
-      <p:sp>
-        <p:nvSpPr>
-          <p:cNvPr id="11" name="TextBox 10">
-            <a:extLst>
-              <a:ext uri="{FF2B5EF4-FFF2-40B4-BE49-F238E27FC236}">
-                <a16:creationId xmlns:a16="http://schemas.microsoft.com/office/drawing/2014/main" id="{8A134A08-045D-4158-8031-59772680E435}"/>
-              </a:ext>
-            </a:extLst>
-          </p:cNvPr>
-          <p:cNvSpPr txBox="1"/>
-          <p:nvPr/>
-        </p:nvSpPr>
-        <p:spPr>
-          <a:xfrm>
-            <a:off x="1992042" y="1247962"/>
-            <a:ext cx="3298532" cy="400110"/>
-          </a:xfrm>
-          <a:prstGeom prst="rect">
-            <a:avLst/>
-          </a:prstGeom>
-          <a:noFill/>
-        </p:spPr>
-        <p:txBody>
-          <a:bodyPr wrap="none" rtlCol="0">
-            <a:spAutoFit/>
-          </a:bodyPr>
-          <a:lstStyle/>
-          <a:p>
-            <a:r>
-              <a:rPr lang="en-US" sz="2000" dirty="0"/>
-              <a:t>Providers Labeled as Innocent</a:t>
-            </a:r>
-          </a:p>
-        </p:txBody>
-      </p:sp>
-      <p:cxnSp>
-        <p:nvCxnSpPr>
-          <p:cNvPr id="16" name="Straight Connector 15">
-            <a:extLst>
-              <a:ext uri="{FF2B5EF4-FFF2-40B4-BE49-F238E27FC236}">
-                <a16:creationId xmlns:a16="http://schemas.microsoft.com/office/drawing/2014/main" id="{40B6AB0A-E9F8-4D38-8517-C782EB7AE3A6}"/>
-              </a:ext>
-            </a:extLst>
-          </p:cNvPr>
-          <p:cNvCxnSpPr>
-            <a:cxnSpLocks/>
-          </p:cNvCxnSpPr>
-          <p:nvPr/>
-        </p:nvCxnSpPr>
-        <p:spPr>
-          <a:xfrm>
-            <a:off x="1109310" y="1796213"/>
-            <a:ext cx="0" cy="4397615"/>
-          </a:xfrm>
-          <a:prstGeom prst="line">
-            <a:avLst/>
-          </a:prstGeom>
-          <a:ln>
-            <a:headEnd type="arrow" w="med" len="med"/>
-            <a:tailEnd type="none" w="med" len="med"/>
-          </a:ln>
-        </p:spPr>
-        <p:style>
-          <a:lnRef idx="1">
-            <a:schemeClr val="accent1"/>
-          </a:lnRef>
-          <a:fillRef idx="0">
-            <a:schemeClr val="accent1"/>
-          </a:fillRef>
-          <a:effectRef idx="0">
-            <a:schemeClr val="accent1"/>
-          </a:effectRef>
-          <a:fontRef idx="minor">
-            <a:schemeClr val="tx1"/>
-          </a:fontRef>
-        </p:style>
-      </p:cxnSp>
-      <p:sp>
-        <p:nvSpPr>
-          <p:cNvPr id="18" name="TextBox 17">
-            <a:extLst>
-              <a:ext uri="{FF2B5EF4-FFF2-40B4-BE49-F238E27FC236}">
-                <a16:creationId xmlns:a16="http://schemas.microsoft.com/office/drawing/2014/main" id="{90A3458C-B743-4AF6-9B86-21763BA21587}"/>
-              </a:ext>
-            </a:extLst>
-          </p:cNvPr>
-          <p:cNvSpPr txBox="1"/>
-          <p:nvPr/>
-        </p:nvSpPr>
-        <p:spPr>
-          <a:xfrm rot="16200000">
-            <a:off x="-529449" y="3681664"/>
-            <a:ext cx="2884123" cy="369332"/>
-          </a:xfrm>
-          <a:prstGeom prst="rect">
-            <a:avLst/>
-          </a:prstGeom>
-          <a:noFill/>
-        </p:spPr>
-        <p:txBody>
-          <a:bodyPr wrap="none" rtlCol="0">
-            <a:spAutoFit/>
-          </a:bodyPr>
-          <a:lstStyle/>
-          <a:p>
-            <a:r>
-              <a:rPr lang="en-US" dirty="0"/>
-              <a:t>Probability of Fraud by Claim</a:t>
-            </a:r>
-          </a:p>
-        </p:txBody>
-      </p:sp>
+        </p:grpSpPr>
+        <p:pic>
+          <p:nvPicPr>
+            <p:cNvPr id="9" name="Picture 8" descr="A picture containing building&#10;&#10;Description automatically generated">
+              <a:extLst>
+                <a:ext uri="{FF2B5EF4-FFF2-40B4-BE49-F238E27FC236}">
+                  <a16:creationId xmlns:a16="http://schemas.microsoft.com/office/drawing/2014/main" id="{B655463C-E8A7-495D-AD16-E98D94BA8485}"/>
+                </a:ext>
+              </a:extLst>
+            </p:cNvPr>
+            <p:cNvPicPr>
+              <a:picLocks noChangeAspect="1"/>
+            </p:cNvPicPr>
+            <p:nvPr/>
+          </p:nvPicPr>
+          <p:blipFill>
+            <a:blip r:embed="rId2">
+              <a:extLst>
+                <a:ext uri="{28A0092B-C50C-407E-A947-70E740481C1C}">
+                  <a14:useLocalDpi xmlns:a14="http://schemas.microsoft.com/office/drawing/2010/main" val="0"/>
+                </a:ext>
+              </a:extLst>
+            </a:blip>
+            <a:stretch>
+              <a:fillRect/>
+            </a:stretch>
+          </p:blipFill>
+          <p:spPr>
+            <a:xfrm>
+              <a:off x="5886454" y="1744806"/>
+              <a:ext cx="4414290" cy="4414290"/>
+            </a:xfrm>
+            <a:prstGeom prst="rect">
+              <a:avLst/>
+            </a:prstGeom>
+            <a:ln>
+              <a:solidFill>
+                <a:schemeClr val="tx1"/>
+              </a:solidFill>
+            </a:ln>
+          </p:spPr>
+        </p:pic>
+        <p:sp>
+          <p:nvSpPr>
+            <p:cNvPr id="10" name="TextBox 9">
+              <a:extLst>
+                <a:ext uri="{FF2B5EF4-FFF2-40B4-BE49-F238E27FC236}">
+                  <a16:creationId xmlns:a16="http://schemas.microsoft.com/office/drawing/2014/main" id="{00A54A29-F17E-454F-BC31-9F451A936B04}"/>
+                </a:ext>
+              </a:extLst>
+            </p:cNvPr>
+            <p:cNvSpPr txBox="1"/>
+            <p:nvPr/>
+          </p:nvSpPr>
+          <p:spPr>
+            <a:xfrm>
+              <a:off x="6203658" y="1273708"/>
+              <a:ext cx="3779881" cy="461665"/>
+            </a:xfrm>
+            <a:prstGeom prst="rect">
+              <a:avLst/>
+            </a:prstGeom>
+            <a:noFill/>
+          </p:spPr>
+          <p:txBody>
+            <a:bodyPr wrap="none" rtlCol="0">
+              <a:spAutoFit/>
+            </a:bodyPr>
+            <a:lstStyle/>
+            <a:p>
+              <a:r>
+                <a:rPr lang="en-US" sz="2400" dirty="0"/>
+                <a:t>Providers Labeled as Suspect</a:t>
+              </a:r>
+            </a:p>
+          </p:txBody>
+        </p:sp>
+        <p:pic>
+          <p:nvPicPr>
+            <p:cNvPr id="7" name="Picture 6" descr="Shape&#10;&#10;Description automatically generated">
+              <a:extLst>
+                <a:ext uri="{FF2B5EF4-FFF2-40B4-BE49-F238E27FC236}">
+                  <a16:creationId xmlns:a16="http://schemas.microsoft.com/office/drawing/2014/main" id="{2D5CBBF0-9573-4481-8359-F6D62258D992}"/>
+                </a:ext>
+              </a:extLst>
+            </p:cNvPr>
+            <p:cNvPicPr>
+              <a:picLocks noChangeAspect="1"/>
+            </p:cNvPicPr>
+            <p:nvPr/>
+          </p:nvPicPr>
+          <p:blipFill>
+            <a:blip r:embed="rId3">
+              <a:extLst>
+                <a:ext uri="{28A0092B-C50C-407E-A947-70E740481C1C}">
+                  <a14:useLocalDpi xmlns:a14="http://schemas.microsoft.com/office/drawing/2010/main" val="0"/>
+                </a:ext>
+              </a:extLst>
+            </a:blip>
+            <a:stretch>
+              <a:fillRect/>
+            </a:stretch>
+          </p:blipFill>
+          <p:spPr>
+            <a:xfrm>
+              <a:off x="1434162" y="1744805"/>
+              <a:ext cx="4414291" cy="4414291"/>
+            </a:xfrm>
+            <a:prstGeom prst="rect">
+              <a:avLst/>
+            </a:prstGeom>
+            <a:ln>
+              <a:solidFill>
+                <a:schemeClr val="tx1"/>
+              </a:solidFill>
+            </a:ln>
+          </p:spPr>
+        </p:pic>
+        <p:sp>
+          <p:nvSpPr>
+            <p:cNvPr id="11" name="TextBox 10">
+              <a:extLst>
+                <a:ext uri="{FF2B5EF4-FFF2-40B4-BE49-F238E27FC236}">
+                  <a16:creationId xmlns:a16="http://schemas.microsoft.com/office/drawing/2014/main" id="{8A134A08-045D-4158-8031-59772680E435}"/>
+                </a:ext>
+              </a:extLst>
+            </p:cNvPr>
+            <p:cNvSpPr txBox="1"/>
+            <p:nvPr/>
+          </p:nvSpPr>
+          <p:spPr>
+            <a:xfrm>
+              <a:off x="1678532" y="1273708"/>
+              <a:ext cx="3916457" cy="461665"/>
+            </a:xfrm>
+            <a:prstGeom prst="rect">
+              <a:avLst/>
+            </a:prstGeom>
+            <a:noFill/>
+          </p:spPr>
+          <p:txBody>
+            <a:bodyPr wrap="none" rtlCol="0">
+              <a:spAutoFit/>
+            </a:bodyPr>
+            <a:lstStyle/>
+            <a:p>
+              <a:r>
+                <a:rPr lang="en-US" sz="2400" dirty="0"/>
+                <a:t>Providers Labeled as Innocent</a:t>
+              </a:r>
+            </a:p>
+          </p:txBody>
+        </p:sp>
+        <p:cxnSp>
+          <p:nvCxnSpPr>
+            <p:cNvPr id="16" name="Straight Connector 15">
+              <a:extLst>
+                <a:ext uri="{FF2B5EF4-FFF2-40B4-BE49-F238E27FC236}">
+                  <a16:creationId xmlns:a16="http://schemas.microsoft.com/office/drawing/2014/main" id="{40B6AB0A-E9F8-4D38-8517-C782EB7AE3A6}"/>
+                </a:ext>
+              </a:extLst>
+            </p:cNvPr>
+            <p:cNvCxnSpPr>
+              <a:cxnSpLocks/>
+            </p:cNvCxnSpPr>
+            <p:nvPr/>
+          </p:nvCxnSpPr>
+          <p:spPr>
+            <a:xfrm>
+              <a:off x="1230495" y="1761481"/>
+              <a:ext cx="0" cy="4397615"/>
+            </a:xfrm>
+            <a:prstGeom prst="line">
+              <a:avLst/>
+            </a:prstGeom>
+            <a:ln>
+              <a:headEnd type="arrow" w="med" len="med"/>
+              <a:tailEnd type="none" w="med" len="med"/>
+            </a:ln>
+          </p:spPr>
+          <p:style>
+            <a:lnRef idx="1">
+              <a:schemeClr val="accent1"/>
+            </a:lnRef>
+            <a:fillRef idx="0">
+              <a:schemeClr val="accent1"/>
+            </a:fillRef>
+            <a:effectRef idx="0">
+              <a:schemeClr val="accent1"/>
+            </a:effectRef>
+            <a:fontRef idx="minor">
+              <a:schemeClr val="tx1"/>
+            </a:fontRef>
+          </p:style>
+        </p:cxnSp>
+        <p:sp>
+          <p:nvSpPr>
+            <p:cNvPr id="18" name="TextBox 17">
+              <a:extLst>
+                <a:ext uri="{FF2B5EF4-FFF2-40B4-BE49-F238E27FC236}">
+                  <a16:creationId xmlns:a16="http://schemas.microsoft.com/office/drawing/2014/main" id="{90A3458C-B743-4AF6-9B86-21763BA21587}"/>
+                </a:ext>
+              </a:extLst>
+            </p:cNvPr>
+            <p:cNvSpPr txBox="1"/>
+            <p:nvPr/>
+          </p:nvSpPr>
+          <p:spPr>
+            <a:xfrm rot="16200000">
+              <a:off x="-408264" y="3646932"/>
+              <a:ext cx="2884123" cy="369332"/>
+            </a:xfrm>
+            <a:prstGeom prst="rect">
+              <a:avLst/>
+            </a:prstGeom>
+            <a:noFill/>
+          </p:spPr>
+          <p:txBody>
+            <a:bodyPr wrap="none" rtlCol="0">
+              <a:spAutoFit/>
+            </a:bodyPr>
+            <a:lstStyle/>
+            <a:p>
+              <a:r>
+                <a:rPr lang="en-US" dirty="0"/>
+                <a:t>Probability of Fraud by Claim</a:t>
+              </a:r>
+            </a:p>
+          </p:txBody>
+        </p:sp>
+      </p:grpSp>
     </p:spTree>
     <p:extLst>
       <p:ext uri="{BB962C8B-B14F-4D97-AF65-F5344CB8AC3E}">
@@ -19414,225 +19466,256 @@
           </a:fontRef>
         </p:style>
       </p:cxnSp>
-      <p:pic>
-        <p:nvPicPr>
-          <p:cNvPr id="9" name="Picture 8" descr="Background pattern&#10;&#10;Description automatically generated">
+      <p:grpSp>
+        <p:nvGrpSpPr>
+          <p:cNvPr id="4" name="Group 3">
             <a:extLst>
               <a:ext uri="{FF2B5EF4-FFF2-40B4-BE49-F238E27FC236}">
-                <a16:creationId xmlns:a16="http://schemas.microsoft.com/office/drawing/2014/main" id="{246E1472-32C7-4652-9096-E83E0DADC794}"/>
+                <a16:creationId xmlns:a16="http://schemas.microsoft.com/office/drawing/2014/main" id="{398B82E3-062F-4772-AEC0-AD03C3B43CE1}"/>
               </a:ext>
             </a:extLst>
           </p:cNvPr>
-          <p:cNvPicPr>
-            <a:picLocks noChangeAspect="1"/>
-          </p:cNvPicPr>
+          <p:cNvGrpSpPr/>
           <p:nvPr/>
-        </p:nvPicPr>
-        <p:blipFill>
-          <a:blip r:embed="rId2">
-            <a:extLst>
-              <a:ext uri="{28A0092B-C50C-407E-A947-70E740481C1C}">
-                <a14:useLocalDpi xmlns:a14="http://schemas.microsoft.com/office/drawing/2010/main" val="0"/>
-              </a:ext>
-            </a:extLst>
-          </a:blip>
-          <a:stretch>
-            <a:fillRect/>
-          </a:stretch>
-        </p:blipFill>
-        <p:spPr>
+        </p:nvGrpSpPr>
+        <p:grpSpPr>
           <a:xfrm>
-            <a:off x="6373382" y="1739737"/>
-            <a:ext cx="4430027" cy="4430027"/>
+            <a:off x="1097281" y="1302014"/>
+            <a:ext cx="9362565" cy="4902236"/>
+            <a:chOff x="1097281" y="1302014"/>
+            <a:chExt cx="9362565" cy="4902236"/>
           </a:xfrm>
-          <a:prstGeom prst="rect">
-            <a:avLst/>
-          </a:prstGeom>
-        </p:spPr>
-      </p:pic>
-      <p:sp>
-        <p:nvSpPr>
-          <p:cNvPr id="16" name="TextBox 15">
-            <a:extLst>
-              <a:ext uri="{FF2B5EF4-FFF2-40B4-BE49-F238E27FC236}">
-                <a16:creationId xmlns:a16="http://schemas.microsoft.com/office/drawing/2014/main" id="{F8DBECA2-B951-4EDB-B4CA-1A51CD6BA1D7}"/>
-              </a:ext>
-            </a:extLst>
-          </p:cNvPr>
-          <p:cNvSpPr txBox="1"/>
-          <p:nvPr/>
-        </p:nvSpPr>
-        <p:spPr>
-          <a:xfrm>
-            <a:off x="6869751" y="1324884"/>
-            <a:ext cx="3437288" cy="400110"/>
-          </a:xfrm>
-          <a:prstGeom prst="rect">
-            <a:avLst/>
-          </a:prstGeom>
-          <a:noFill/>
-        </p:spPr>
-        <p:txBody>
-          <a:bodyPr wrap="none" rtlCol="0">
-            <a:spAutoFit/>
-          </a:bodyPr>
-          <a:lstStyle/>
-          <a:p>
-            <a:r>
-              <a:rPr lang="en-US" sz="2000" dirty="0"/>
-              <a:t>Incorrectly Labeled as Innocent</a:t>
-            </a:r>
-          </a:p>
-        </p:txBody>
-      </p:sp>
-      <p:pic>
-        <p:nvPicPr>
-          <p:cNvPr id="7" name="Picture 6" descr="Background pattern&#10;&#10;Description automatically generated">
-            <a:extLst>
-              <a:ext uri="{FF2B5EF4-FFF2-40B4-BE49-F238E27FC236}">
-                <a16:creationId xmlns:a16="http://schemas.microsoft.com/office/drawing/2014/main" id="{827D3FBE-3FA1-43F0-808F-0FABD1EE1EFE}"/>
-              </a:ext>
-            </a:extLst>
-          </p:cNvPr>
-          <p:cNvPicPr>
-            <a:picLocks noChangeAspect="1"/>
-          </p:cNvPicPr>
-          <p:nvPr/>
-        </p:nvPicPr>
-        <p:blipFill>
-          <a:blip r:embed="rId3">
-            <a:extLst>
-              <a:ext uri="{28A0092B-C50C-407E-A947-70E740481C1C}">
-                <a14:useLocalDpi xmlns:a14="http://schemas.microsoft.com/office/drawing/2010/main" val="0"/>
-              </a:ext>
-            </a:extLst>
-          </a:blip>
-          <a:stretch>
-            <a:fillRect/>
-          </a:stretch>
-        </p:blipFill>
-        <p:spPr>
-          <a:xfrm>
-            <a:off x="1475887" y="1745545"/>
-            <a:ext cx="4430027" cy="4430027"/>
-          </a:xfrm>
-          <a:prstGeom prst="rect">
-            <a:avLst/>
-          </a:prstGeom>
-        </p:spPr>
-      </p:pic>
-      <p:sp>
-        <p:nvSpPr>
-          <p:cNvPr id="17" name="TextBox 16">
-            <a:extLst>
-              <a:ext uri="{FF2B5EF4-FFF2-40B4-BE49-F238E27FC236}">
-                <a16:creationId xmlns:a16="http://schemas.microsoft.com/office/drawing/2014/main" id="{C1EC2E70-87C3-44A8-B49B-BABBFD482E0B}"/>
-              </a:ext>
-            </a:extLst>
-          </p:cNvPr>
-          <p:cNvSpPr txBox="1"/>
-          <p:nvPr/>
-        </p:nvSpPr>
-        <p:spPr>
-          <a:xfrm>
-            <a:off x="2027976" y="1330693"/>
-            <a:ext cx="3325847" cy="400110"/>
-          </a:xfrm>
-          <a:prstGeom prst="rect">
-            <a:avLst/>
-          </a:prstGeom>
-          <a:noFill/>
-        </p:spPr>
-        <p:txBody>
-          <a:bodyPr wrap="none" rtlCol="0">
-            <a:spAutoFit/>
-          </a:bodyPr>
-          <a:lstStyle/>
-          <a:p>
-            <a:r>
-              <a:rPr lang="en-US" sz="2000" dirty="0"/>
-              <a:t>Incorrectly Labeled as Suspect</a:t>
-            </a:r>
-          </a:p>
-        </p:txBody>
-      </p:sp>
-      <p:cxnSp>
-        <p:nvCxnSpPr>
-          <p:cNvPr id="21" name="Straight Connector 20">
-            <a:extLst>
-              <a:ext uri="{FF2B5EF4-FFF2-40B4-BE49-F238E27FC236}">
-                <a16:creationId xmlns:a16="http://schemas.microsoft.com/office/drawing/2014/main" id="{2BF56B12-D5EB-404B-9683-DCBC5A77D084}"/>
-              </a:ext>
-            </a:extLst>
-          </p:cNvPr>
-          <p:cNvCxnSpPr>
-            <a:cxnSpLocks/>
-          </p:cNvCxnSpPr>
-          <p:nvPr/>
-        </p:nvCxnSpPr>
-        <p:spPr>
-          <a:xfrm>
-            <a:off x="1109310" y="1796213"/>
-            <a:ext cx="0" cy="4397615"/>
-          </a:xfrm>
-          <a:prstGeom prst="line">
-            <a:avLst/>
-          </a:prstGeom>
-          <a:ln>
-            <a:headEnd type="arrow" w="med" len="med"/>
-            <a:tailEnd type="none" w="med" len="med"/>
-          </a:ln>
-        </p:spPr>
-        <p:style>
-          <a:lnRef idx="1">
-            <a:schemeClr val="accent1"/>
-          </a:lnRef>
-          <a:fillRef idx="0">
-            <a:schemeClr val="accent1"/>
-          </a:fillRef>
-          <a:effectRef idx="0">
-            <a:schemeClr val="accent1"/>
-          </a:effectRef>
-          <a:fontRef idx="minor">
-            <a:schemeClr val="tx1"/>
-          </a:fontRef>
-        </p:style>
-      </p:cxnSp>
-      <p:sp>
-        <p:nvSpPr>
-          <p:cNvPr id="22" name="TextBox 21">
-            <a:extLst>
-              <a:ext uri="{FF2B5EF4-FFF2-40B4-BE49-F238E27FC236}">
-                <a16:creationId xmlns:a16="http://schemas.microsoft.com/office/drawing/2014/main" id="{31B02B41-B88C-46E6-9E71-4B48AEAFD8C9}"/>
-              </a:ext>
-            </a:extLst>
-          </p:cNvPr>
-          <p:cNvSpPr txBox="1"/>
-          <p:nvPr/>
-        </p:nvSpPr>
-        <p:spPr>
-          <a:xfrm rot="16200000">
-            <a:off x="-529449" y="3681664"/>
-            <a:ext cx="2884123" cy="369332"/>
-          </a:xfrm>
-          <a:prstGeom prst="rect">
-            <a:avLst/>
-          </a:prstGeom>
-          <a:noFill/>
-        </p:spPr>
-        <p:txBody>
-          <a:bodyPr wrap="none" rtlCol="0">
-            <a:spAutoFit/>
-          </a:bodyPr>
-          <a:lstStyle/>
-          <a:p>
-            <a:r>
-              <a:rPr lang="en-US" dirty="0"/>
-              <a:t>Probability of Fraud by Claim</a:t>
-            </a:r>
-          </a:p>
-        </p:txBody>
-      </p:sp>
+        </p:grpSpPr>
+        <p:pic>
+          <p:nvPicPr>
+            <p:cNvPr id="9" name="Picture 8" descr="Background pattern&#10;&#10;Description automatically generated">
+              <a:extLst>
+                <a:ext uri="{FF2B5EF4-FFF2-40B4-BE49-F238E27FC236}">
+                  <a16:creationId xmlns:a16="http://schemas.microsoft.com/office/drawing/2014/main" id="{246E1472-32C7-4652-9096-E83E0DADC794}"/>
+                </a:ext>
+              </a:extLst>
+            </p:cNvPr>
+            <p:cNvPicPr>
+              <a:picLocks noChangeAspect="1"/>
+            </p:cNvPicPr>
+            <p:nvPr/>
+          </p:nvPicPr>
+          <p:blipFill>
+            <a:blip r:embed="rId2">
+              <a:extLst>
+                <a:ext uri="{28A0092B-C50C-407E-A947-70E740481C1C}">
+                  <a14:useLocalDpi xmlns:a14="http://schemas.microsoft.com/office/drawing/2010/main" val="0"/>
+                </a:ext>
+              </a:extLst>
+            </a:blip>
+            <a:stretch>
+              <a:fillRect/>
+            </a:stretch>
+          </p:blipFill>
+          <p:spPr>
+            <a:xfrm>
+              <a:off x="6029819" y="1768951"/>
+              <a:ext cx="4430027" cy="4430027"/>
+            </a:xfrm>
+            <a:prstGeom prst="rect">
+              <a:avLst/>
+            </a:prstGeom>
+            <a:ln>
+              <a:solidFill>
+                <a:schemeClr val="tx1"/>
+              </a:solidFill>
+            </a:ln>
+          </p:spPr>
+        </p:pic>
+        <p:sp>
+          <p:nvSpPr>
+            <p:cNvPr id="16" name="TextBox 15">
+              <a:extLst>
+                <a:ext uri="{FF2B5EF4-FFF2-40B4-BE49-F238E27FC236}">
+                  <a16:creationId xmlns:a16="http://schemas.microsoft.com/office/drawing/2014/main" id="{F8DBECA2-B951-4EDB-B4CA-1A51CD6BA1D7}"/>
+                </a:ext>
+              </a:extLst>
+            </p:cNvPr>
+            <p:cNvSpPr txBox="1"/>
+            <p:nvPr/>
+          </p:nvSpPr>
+          <p:spPr>
+            <a:xfrm>
+              <a:off x="6203984" y="1302014"/>
+              <a:ext cx="4081695" cy="461665"/>
+            </a:xfrm>
+            <a:prstGeom prst="rect">
+              <a:avLst/>
+            </a:prstGeom>
+            <a:noFill/>
+          </p:spPr>
+          <p:txBody>
+            <a:bodyPr wrap="none" rtlCol="0">
+              <a:spAutoFit/>
+            </a:bodyPr>
+            <a:lstStyle/>
+            <a:p>
+              <a:r>
+                <a:rPr lang="en-US" sz="2400" dirty="0"/>
+                <a:t>Incorrectly Labeled as Innocent</a:t>
+              </a:r>
+            </a:p>
+          </p:txBody>
+        </p:sp>
+        <p:pic>
+          <p:nvPicPr>
+            <p:cNvPr id="7" name="Picture 6" descr="Background pattern&#10;&#10;Description automatically generated">
+              <a:extLst>
+                <a:ext uri="{FF2B5EF4-FFF2-40B4-BE49-F238E27FC236}">
+                  <a16:creationId xmlns:a16="http://schemas.microsoft.com/office/drawing/2014/main" id="{827D3FBE-3FA1-43F0-808F-0FABD1EE1EFE}"/>
+                </a:ext>
+              </a:extLst>
+            </p:cNvPr>
+            <p:cNvPicPr>
+              <a:picLocks noChangeAspect="1"/>
+            </p:cNvPicPr>
+            <p:nvPr/>
+          </p:nvPicPr>
+          <p:blipFill>
+            <a:blip r:embed="rId3">
+              <a:extLst>
+                <a:ext uri="{28A0092B-C50C-407E-A947-70E740481C1C}">
+                  <a14:useLocalDpi xmlns:a14="http://schemas.microsoft.com/office/drawing/2010/main" val="0"/>
+                </a:ext>
+              </a:extLst>
+            </a:blip>
+            <a:stretch>
+              <a:fillRect/>
+            </a:stretch>
+          </p:blipFill>
+          <p:spPr>
+            <a:xfrm>
+              <a:off x="1599792" y="1774223"/>
+              <a:ext cx="4430027" cy="4430027"/>
+            </a:xfrm>
+            <a:prstGeom prst="rect">
+              <a:avLst/>
+            </a:prstGeom>
+            <a:ln>
+              <a:solidFill>
+                <a:schemeClr val="tx1"/>
+              </a:solidFill>
+            </a:ln>
+          </p:spPr>
+        </p:pic>
+        <p:sp>
+          <p:nvSpPr>
+            <p:cNvPr id="17" name="TextBox 16">
+              <a:extLst>
+                <a:ext uri="{FF2B5EF4-FFF2-40B4-BE49-F238E27FC236}">
+                  <a16:creationId xmlns:a16="http://schemas.microsoft.com/office/drawing/2014/main" id="{C1EC2E70-87C3-44A8-B49B-BABBFD482E0B}"/>
+                </a:ext>
+              </a:extLst>
+            </p:cNvPr>
+            <p:cNvSpPr txBox="1"/>
+            <p:nvPr/>
+          </p:nvSpPr>
+          <p:spPr>
+            <a:xfrm>
+              <a:off x="1842246" y="1302414"/>
+              <a:ext cx="3945119" cy="461665"/>
+            </a:xfrm>
+            <a:prstGeom prst="rect">
+              <a:avLst/>
+            </a:prstGeom>
+            <a:noFill/>
+          </p:spPr>
+          <p:txBody>
+            <a:bodyPr wrap="none" rtlCol="0">
+              <a:spAutoFit/>
+            </a:bodyPr>
+            <a:lstStyle/>
+            <a:p>
+              <a:r>
+                <a:rPr lang="en-US" sz="2400" dirty="0"/>
+                <a:t>Incorrectly Labeled as Suspect</a:t>
+              </a:r>
+            </a:p>
+          </p:txBody>
+        </p:sp>
+        <p:cxnSp>
+          <p:nvCxnSpPr>
+            <p:cNvPr id="21" name="Straight Connector 20">
+              <a:extLst>
+                <a:ext uri="{FF2B5EF4-FFF2-40B4-BE49-F238E27FC236}">
+                  <a16:creationId xmlns:a16="http://schemas.microsoft.com/office/drawing/2014/main" id="{2BF56B12-D5EB-404B-9683-DCBC5A77D084}"/>
+                </a:ext>
+              </a:extLst>
+            </p:cNvPr>
+            <p:cNvCxnSpPr>
+              <a:cxnSpLocks/>
+            </p:cNvCxnSpPr>
+            <p:nvPr/>
+          </p:nvCxnSpPr>
+          <p:spPr>
+            <a:xfrm>
+              <a:off x="1478644" y="1801363"/>
+              <a:ext cx="0" cy="4397615"/>
+            </a:xfrm>
+            <a:prstGeom prst="line">
+              <a:avLst/>
+            </a:prstGeom>
+            <a:ln>
+              <a:headEnd type="arrow" w="med" len="med"/>
+              <a:tailEnd type="none" w="med" len="med"/>
+            </a:ln>
+          </p:spPr>
+          <p:style>
+            <a:lnRef idx="1">
+              <a:schemeClr val="accent1"/>
+            </a:lnRef>
+            <a:fillRef idx="0">
+              <a:schemeClr val="accent1"/>
+            </a:fillRef>
+            <a:effectRef idx="0">
+              <a:schemeClr val="accent1"/>
+            </a:effectRef>
+            <a:fontRef idx="minor">
+              <a:schemeClr val="tx1"/>
+            </a:fontRef>
+          </p:style>
+        </p:cxnSp>
+        <p:sp>
+          <p:nvSpPr>
+            <p:cNvPr id="22" name="TextBox 21">
+              <a:extLst>
+                <a:ext uri="{FF2B5EF4-FFF2-40B4-BE49-F238E27FC236}">
+                  <a16:creationId xmlns:a16="http://schemas.microsoft.com/office/drawing/2014/main" id="{31B02B41-B88C-46E6-9E71-4B48AEAFD8C9}"/>
+                </a:ext>
+              </a:extLst>
+            </p:cNvPr>
+            <p:cNvSpPr txBox="1"/>
+            <p:nvPr/>
+          </p:nvSpPr>
+          <p:spPr>
+            <a:xfrm rot="16200000">
+              <a:off x="-160115" y="3686814"/>
+              <a:ext cx="2884123" cy="369332"/>
+            </a:xfrm>
+            <a:prstGeom prst="rect">
+              <a:avLst/>
+            </a:prstGeom>
+            <a:noFill/>
+          </p:spPr>
+          <p:txBody>
+            <a:bodyPr wrap="none" rtlCol="0">
+              <a:spAutoFit/>
+            </a:bodyPr>
+            <a:lstStyle/>
+            <a:p>
+              <a:r>
+                <a:rPr lang="en-US" dirty="0"/>
+                <a:t>Probability of Fraud by Claim</a:t>
+              </a:r>
+            </a:p>
+          </p:txBody>
+        </p:sp>
+      </p:grpSp>
     </p:spTree>
     <p:extLst>
       <p:ext uri="{BB962C8B-B14F-4D97-AF65-F5344CB8AC3E}">
@@ -19793,47 +19876,12 @@
           </a:fontRef>
         </p:style>
       </p:cxnSp>
-      <p:sp>
-        <p:nvSpPr>
-          <p:cNvPr id="10" name="TextBox 9">
+      <p:grpSp>
+        <p:nvGrpSpPr>
+          <p:cNvPr id="20" name="Group 19">
             <a:extLst>
               <a:ext uri="{FF2B5EF4-FFF2-40B4-BE49-F238E27FC236}">
-                <a16:creationId xmlns:a16="http://schemas.microsoft.com/office/drawing/2014/main" id="{E4300B94-5674-4488-A64B-37550411019A}"/>
-              </a:ext>
-            </a:extLst>
-          </p:cNvPr>
-          <p:cNvSpPr txBox="1"/>
-          <p:nvPr/>
-        </p:nvSpPr>
-        <p:spPr>
-          <a:xfrm>
-            <a:off x="4701090" y="3962550"/>
-            <a:ext cx="1425390" cy="400110"/>
-          </a:xfrm>
-          <a:prstGeom prst="rect">
-            <a:avLst/>
-          </a:prstGeom>
-          <a:noFill/>
-        </p:spPr>
-        <p:txBody>
-          <a:bodyPr wrap="none" rtlCol="0">
-            <a:spAutoFit/>
-          </a:bodyPr>
-          <a:lstStyle/>
-          <a:p>
-            <a:r>
-              <a:rPr lang="en-US" sz="2000" dirty="0"/>
-              <a:t>Actual Class</a:t>
-            </a:r>
-          </a:p>
-        </p:txBody>
-      </p:sp>
-      <p:grpSp>
-        <p:nvGrpSpPr>
-          <p:cNvPr id="4" name="Group 3">
-            <a:extLst>
-              <a:ext uri="{FF2B5EF4-FFF2-40B4-BE49-F238E27FC236}">
-                <a16:creationId xmlns:a16="http://schemas.microsoft.com/office/drawing/2014/main" id="{7CBA2195-33DB-4B7E-8E33-C2CE253EED7A}"/>
+                <a16:creationId xmlns:a16="http://schemas.microsoft.com/office/drawing/2014/main" id="{F845ACF1-2E2F-409B-A5C0-AC7E5E44F6B9}"/>
               </a:ext>
             </a:extLst>
           </p:cNvPr>
@@ -19842,332 +19890,492 @@
         </p:nvGrpSpPr>
         <p:grpSpPr>
           <a:xfrm>
-            <a:off x="6533595" y="2062647"/>
-            <a:ext cx="4090655" cy="4145285"/>
-            <a:chOff x="6533595" y="2062647"/>
-            <a:chExt cx="4090655" cy="4145285"/>
+            <a:off x="4034978" y="1111667"/>
+            <a:ext cx="4931920" cy="4893071"/>
+            <a:chOff x="4034978" y="1111667"/>
+            <a:chExt cx="4931920" cy="4893071"/>
           </a:xfrm>
         </p:grpSpPr>
-        <p:pic>
-          <p:nvPicPr>
-            <p:cNvPr id="7" name="Picture 6" descr="A picture containing building&#10;&#10;Description automatically generated">
+        <p:sp>
+          <p:nvSpPr>
+            <p:cNvPr id="10" name="TextBox 9">
               <a:extLst>
                 <a:ext uri="{FF2B5EF4-FFF2-40B4-BE49-F238E27FC236}">
-                  <a16:creationId xmlns:a16="http://schemas.microsoft.com/office/drawing/2014/main" id="{1CFC7554-5A7A-4B77-A3BE-2146FFAE2E75}"/>
+                  <a16:creationId xmlns:a16="http://schemas.microsoft.com/office/drawing/2014/main" id="{E4300B94-5674-4488-A64B-37550411019A}"/>
                 </a:ext>
               </a:extLst>
             </p:cNvPr>
-            <p:cNvPicPr>
-              <a:picLocks noChangeAspect="1"/>
-            </p:cNvPicPr>
+            <p:cNvSpPr txBox="1"/>
             <p:nvPr/>
-          </p:nvPicPr>
-          <p:blipFill>
-            <a:blip r:embed="rId2">
-              <a:extLst>
-                <a:ext uri="{28A0092B-C50C-407E-A947-70E740481C1C}">
-                  <a14:useLocalDpi xmlns:a14="http://schemas.microsoft.com/office/drawing/2010/main" val="0"/>
-                </a:ext>
-              </a:extLst>
-            </a:blip>
-            <a:stretch>
-              <a:fillRect/>
-            </a:stretch>
-          </p:blipFill>
+          </p:nvSpPr>
           <p:spPr>
-            <a:xfrm>
-              <a:off x="8578923" y="4162605"/>
-              <a:ext cx="2045327" cy="2045327"/>
+            <a:xfrm rot="16200000">
+              <a:off x="3522338" y="3570628"/>
+              <a:ext cx="1425390" cy="400110"/>
             </a:xfrm>
             <a:prstGeom prst="rect">
               <a:avLst/>
             </a:prstGeom>
+            <a:noFill/>
           </p:spPr>
-        </p:pic>
-        <p:pic>
-          <p:nvPicPr>
-            <p:cNvPr id="9" name="Picture 8" descr="Background pattern&#10;&#10;Description automatically generated">
+          <p:txBody>
+            <a:bodyPr wrap="none" rtlCol="0">
+              <a:spAutoFit/>
+            </a:bodyPr>
+            <a:lstStyle/>
+            <a:p>
+              <a:r>
+                <a:rPr lang="en-US" sz="2000" dirty="0"/>
+                <a:t>Actual Class</a:t>
+              </a:r>
+            </a:p>
+          </p:txBody>
+        </p:sp>
+        <p:grpSp>
+          <p:nvGrpSpPr>
+            <p:cNvPr id="4" name="Group 3">
               <a:extLst>
                 <a:ext uri="{FF2B5EF4-FFF2-40B4-BE49-F238E27FC236}">
-                  <a16:creationId xmlns:a16="http://schemas.microsoft.com/office/drawing/2014/main" id="{594883BF-1573-4D93-80C4-D925C3BD4EB9}"/>
+                  <a16:creationId xmlns:a16="http://schemas.microsoft.com/office/drawing/2014/main" id="{7CBA2195-33DB-4B7E-8E33-C2CE253EED7A}"/>
                 </a:ext>
               </a:extLst>
             </p:cNvPr>
-            <p:cNvPicPr>
-              <a:picLocks noChangeAspect="1"/>
-            </p:cNvPicPr>
+            <p:cNvGrpSpPr/>
             <p:nvPr/>
-          </p:nvPicPr>
-          <p:blipFill>
-            <a:blip r:embed="rId3">
+          </p:nvGrpSpPr>
+          <p:grpSpPr>
+            <a:xfrm>
+              <a:off x="4876243" y="1912620"/>
+              <a:ext cx="4090655" cy="4092118"/>
+              <a:chOff x="6533593" y="2063562"/>
+              <a:chExt cx="4090655" cy="4092118"/>
+            </a:xfrm>
+          </p:grpSpPr>
+          <p:pic>
+            <p:nvPicPr>
+              <p:cNvPr id="7" name="Picture 6" descr="A picture containing building&#10;&#10;Description automatically generated">
+                <a:extLst>
+                  <a:ext uri="{FF2B5EF4-FFF2-40B4-BE49-F238E27FC236}">
+                    <a16:creationId xmlns:a16="http://schemas.microsoft.com/office/drawing/2014/main" id="{1CFC7554-5A7A-4B77-A3BE-2146FFAE2E75}"/>
+                  </a:ext>
+                </a:extLst>
+              </p:cNvPr>
+              <p:cNvPicPr>
+                <a:picLocks noChangeAspect="1"/>
+              </p:cNvPicPr>
+              <p:nvPr/>
+            </p:nvPicPr>
+            <p:blipFill>
+              <a:blip r:embed="rId2">
+                <a:extLst>
+                  <a:ext uri="{28A0092B-C50C-407E-A947-70E740481C1C}">
+                    <a14:useLocalDpi xmlns:a14="http://schemas.microsoft.com/office/drawing/2010/main" val="0"/>
+                  </a:ext>
+                </a:extLst>
+              </a:blip>
+              <a:stretch>
+                <a:fillRect/>
+              </a:stretch>
+            </p:blipFill>
+            <p:spPr>
+              <a:xfrm>
+                <a:off x="8578921" y="4110353"/>
+                <a:ext cx="2045327" cy="2045327"/>
+              </a:xfrm>
+              <a:prstGeom prst="rect">
+                <a:avLst/>
+              </a:prstGeom>
+              <a:ln>
+                <a:solidFill>
+                  <a:schemeClr val="tx1"/>
+                </a:solidFill>
+              </a:ln>
+            </p:spPr>
+          </p:pic>
+          <p:pic>
+            <p:nvPicPr>
+              <p:cNvPr id="9" name="Picture 8" descr="Background pattern&#10;&#10;Description automatically generated">
+                <a:extLst>
+                  <a:ext uri="{FF2B5EF4-FFF2-40B4-BE49-F238E27FC236}">
+                    <a16:creationId xmlns:a16="http://schemas.microsoft.com/office/drawing/2014/main" id="{594883BF-1573-4D93-80C4-D925C3BD4EB9}"/>
+                  </a:ext>
+                </a:extLst>
+              </p:cNvPr>
+              <p:cNvPicPr>
+                <a:picLocks noChangeAspect="1"/>
+              </p:cNvPicPr>
+              <p:nvPr/>
+            </p:nvPicPr>
+            <p:blipFill>
+              <a:blip r:embed="rId3">
+                <a:extLst>
+                  <a:ext uri="{28A0092B-C50C-407E-A947-70E740481C1C}">
+                    <a14:useLocalDpi xmlns:a14="http://schemas.microsoft.com/office/drawing/2010/main" val="0"/>
+                  </a:ext>
+                </a:extLst>
+              </a:blip>
+              <a:stretch>
+                <a:fillRect/>
+              </a:stretch>
+            </p:blipFill>
+            <p:spPr>
+              <a:xfrm>
+                <a:off x="6533593" y="4110352"/>
+                <a:ext cx="2045327" cy="2045327"/>
+              </a:xfrm>
+              <a:prstGeom prst="rect">
+                <a:avLst/>
+              </a:prstGeom>
+              <a:ln>
+                <a:solidFill>
+                  <a:schemeClr val="tx1"/>
+                </a:solidFill>
+              </a:ln>
+            </p:spPr>
+          </p:pic>
+          <p:pic>
+            <p:nvPicPr>
+              <p:cNvPr id="12" name="Picture 11" descr="Shape&#10;&#10;Description automatically generated">
+                <a:extLst>
+                  <a:ext uri="{FF2B5EF4-FFF2-40B4-BE49-F238E27FC236}">
+                    <a16:creationId xmlns:a16="http://schemas.microsoft.com/office/drawing/2014/main" id="{F1830363-3AC8-41EA-971D-CF1DEE987140}"/>
+                  </a:ext>
+                </a:extLst>
+              </p:cNvPr>
+              <p:cNvPicPr>
+                <a:picLocks noChangeAspect="1"/>
+              </p:cNvPicPr>
+              <p:nvPr/>
+            </p:nvPicPr>
+            <p:blipFill>
+              <a:blip r:embed="rId4">
+                <a:extLst>
+                  <a:ext uri="{28A0092B-C50C-407E-A947-70E740481C1C}">
+                    <a14:useLocalDpi xmlns:a14="http://schemas.microsoft.com/office/drawing/2010/main" val="0"/>
+                  </a:ext>
+                </a:extLst>
+              </a:blip>
+              <a:stretch>
+                <a:fillRect/>
+              </a:stretch>
+            </p:blipFill>
+            <p:spPr>
+              <a:xfrm>
+                <a:off x="6533594" y="2063562"/>
+                <a:ext cx="2048256" cy="2048256"/>
+              </a:xfrm>
+              <a:prstGeom prst="rect">
+                <a:avLst/>
+              </a:prstGeom>
+              <a:ln>
+                <a:solidFill>
+                  <a:schemeClr val="tx1"/>
+                </a:solidFill>
+              </a:ln>
+            </p:spPr>
+          </p:pic>
+          <p:pic>
+            <p:nvPicPr>
+              <p:cNvPr id="13" name="Picture 12" descr="Background pattern&#10;&#10;Description automatically generated">
+                <a:extLst>
+                  <a:ext uri="{FF2B5EF4-FFF2-40B4-BE49-F238E27FC236}">
+                    <a16:creationId xmlns:a16="http://schemas.microsoft.com/office/drawing/2014/main" id="{3A08E80D-E1B4-4A64-AA78-58576CEE123B}"/>
+                  </a:ext>
+                </a:extLst>
+              </p:cNvPr>
+              <p:cNvPicPr>
+                <a:picLocks noChangeAspect="1"/>
+              </p:cNvPicPr>
+              <p:nvPr/>
+            </p:nvPicPr>
+            <p:blipFill>
+              <a:blip r:embed="rId5">
+                <a:extLst>
+                  <a:ext uri="{28A0092B-C50C-407E-A947-70E740481C1C}">
+                    <a14:useLocalDpi xmlns:a14="http://schemas.microsoft.com/office/drawing/2010/main" val="0"/>
+                  </a:ext>
+                </a:extLst>
+              </a:blip>
+              <a:stretch>
+                <a:fillRect/>
+              </a:stretch>
+            </p:blipFill>
+            <p:spPr>
+              <a:xfrm>
+                <a:off x="8578921" y="2065026"/>
+                <a:ext cx="2045327" cy="2045327"/>
+              </a:xfrm>
+              <a:prstGeom prst="rect">
+                <a:avLst/>
+              </a:prstGeom>
+              <a:ln>
+                <a:solidFill>
+                  <a:schemeClr val="tx1"/>
+                </a:solidFill>
+              </a:ln>
+            </p:spPr>
+          </p:pic>
+        </p:grpSp>
+        <p:sp>
+          <p:nvSpPr>
+            <p:cNvPr id="14" name="TextBox 13">
               <a:extLst>
-                <a:ext uri="{28A0092B-C50C-407E-A947-70E740481C1C}">
-                  <a14:useLocalDpi xmlns:a14="http://schemas.microsoft.com/office/drawing/2010/main" val="0"/>
+                <a:ext uri="{FF2B5EF4-FFF2-40B4-BE49-F238E27FC236}">
+                  <a16:creationId xmlns:a16="http://schemas.microsoft.com/office/drawing/2014/main" id="{CCF559ED-6D24-4FD1-BF19-4D49C328F260}"/>
                 </a:ext>
               </a:extLst>
-            </a:blip>
-            <a:stretch>
-              <a:fillRect/>
-            </a:stretch>
-          </p:blipFill>
+            </p:cNvPr>
+            <p:cNvSpPr txBox="1"/>
+            <p:nvPr/>
+          </p:nvSpPr>
           <p:spPr>
             <a:xfrm>
-              <a:off x="6533595" y="4162604"/>
-              <a:ext cx="2045327" cy="2045327"/>
+              <a:off x="5344491" y="1512780"/>
+              <a:ext cx="1108830" cy="400110"/>
             </a:xfrm>
             <a:prstGeom prst="rect">
               <a:avLst/>
             </a:prstGeom>
+            <a:noFill/>
           </p:spPr>
-        </p:pic>
-        <p:pic>
-          <p:nvPicPr>
-            <p:cNvPr id="12" name="Picture 11" descr="Shape&#10;&#10;Description automatically generated">
+          <p:txBody>
+            <a:bodyPr wrap="none" rtlCol="0">
+              <a:spAutoFit/>
+            </a:bodyPr>
+            <a:lstStyle/>
+            <a:p>
+              <a:r>
+                <a:rPr lang="en-US" sz="2000" dirty="0"/>
+                <a:t>Innocent</a:t>
+              </a:r>
+            </a:p>
+          </p:txBody>
+        </p:sp>
+        <p:sp>
+          <p:nvSpPr>
+            <p:cNvPr id="15" name="TextBox 14">
               <a:extLst>
                 <a:ext uri="{FF2B5EF4-FFF2-40B4-BE49-F238E27FC236}">
-                  <a16:creationId xmlns:a16="http://schemas.microsoft.com/office/drawing/2014/main" id="{F1830363-3AC8-41EA-971D-CF1DEE987140}"/>
+                  <a16:creationId xmlns:a16="http://schemas.microsoft.com/office/drawing/2014/main" id="{6713A818-0379-408A-892E-D0E8B8A2B578}"/>
                 </a:ext>
               </a:extLst>
             </p:cNvPr>
-            <p:cNvPicPr>
-              <a:picLocks noChangeAspect="1"/>
-            </p:cNvPicPr>
+            <p:cNvSpPr txBox="1"/>
             <p:nvPr/>
-          </p:nvPicPr>
-          <p:blipFill>
-            <a:blip r:embed="rId4">
-              <a:extLst>
-                <a:ext uri="{28A0092B-C50C-407E-A947-70E740481C1C}">
-                  <a14:useLocalDpi xmlns:a14="http://schemas.microsoft.com/office/drawing/2010/main" val="0"/>
-                </a:ext>
-              </a:extLst>
-            </a:blip>
-            <a:stretch>
-              <a:fillRect/>
-            </a:stretch>
-          </p:blipFill>
+          </p:nvSpPr>
           <p:spPr>
             <a:xfrm>
-              <a:off x="6533595" y="2063563"/>
-              <a:ext cx="2038061" cy="2038061"/>
+              <a:off x="7445539" y="1473364"/>
+              <a:ext cx="997389" cy="400110"/>
             </a:xfrm>
             <a:prstGeom prst="rect">
               <a:avLst/>
             </a:prstGeom>
+            <a:noFill/>
           </p:spPr>
-        </p:pic>
-        <p:pic>
-          <p:nvPicPr>
-            <p:cNvPr id="13" name="Picture 12" descr="Background pattern&#10;&#10;Description automatically generated">
+          <p:txBody>
+            <a:bodyPr wrap="none" rtlCol="0">
+              <a:spAutoFit/>
+            </a:bodyPr>
+            <a:lstStyle/>
+            <a:p>
+              <a:r>
+                <a:rPr lang="en-US" sz="2000" dirty="0"/>
+                <a:t>Suspect</a:t>
+              </a:r>
+            </a:p>
+          </p:txBody>
+        </p:sp>
+        <p:sp>
+          <p:nvSpPr>
+            <p:cNvPr id="16" name="TextBox 15">
               <a:extLst>
                 <a:ext uri="{FF2B5EF4-FFF2-40B4-BE49-F238E27FC236}">
-                  <a16:creationId xmlns:a16="http://schemas.microsoft.com/office/drawing/2014/main" id="{3A08E80D-E1B4-4A64-AA78-58576CEE123B}"/>
+                  <a16:creationId xmlns:a16="http://schemas.microsoft.com/office/drawing/2014/main" id="{A7445275-7DD0-4938-9F89-183418010E75}"/>
                 </a:ext>
               </a:extLst>
             </p:cNvPr>
-            <p:cNvPicPr>
-              <a:picLocks noChangeAspect="1"/>
-            </p:cNvPicPr>
+            <p:cNvSpPr txBox="1"/>
             <p:nvPr/>
-          </p:nvPicPr>
-          <p:blipFill>
-            <a:blip r:embed="rId5">
-              <a:extLst>
-                <a:ext uri="{28A0092B-C50C-407E-A947-70E740481C1C}">
-                  <a14:useLocalDpi xmlns:a14="http://schemas.microsoft.com/office/drawing/2010/main" val="0"/>
-                </a:ext>
-              </a:extLst>
-            </a:blip>
-            <a:stretch>
-              <a:fillRect/>
-            </a:stretch>
-          </p:blipFill>
+          </p:nvSpPr>
           <p:spPr>
             <a:xfrm>
-              <a:off x="8578923" y="2062647"/>
-              <a:ext cx="2045327" cy="2045327"/>
+              <a:off x="6183559" y="1111667"/>
+              <a:ext cx="1760675" cy="400110"/>
             </a:xfrm>
             <a:prstGeom prst="rect">
               <a:avLst/>
             </a:prstGeom>
+            <a:noFill/>
           </p:spPr>
-        </p:pic>
+          <p:txBody>
+            <a:bodyPr wrap="none" rtlCol="0">
+              <a:spAutoFit/>
+            </a:bodyPr>
+            <a:lstStyle/>
+            <a:p>
+              <a:r>
+                <a:rPr lang="en-US" sz="2000" dirty="0"/>
+                <a:t>Predicted Class</a:t>
+              </a:r>
+            </a:p>
+          </p:txBody>
+        </p:sp>
+        <p:sp>
+          <p:nvSpPr>
+            <p:cNvPr id="17" name="TextBox 16">
+              <a:extLst>
+                <a:ext uri="{FF2B5EF4-FFF2-40B4-BE49-F238E27FC236}">
+                  <a16:creationId xmlns:a16="http://schemas.microsoft.com/office/drawing/2014/main" id="{E7672CAB-B348-41EF-B228-548B508E4356}"/>
+                </a:ext>
+              </a:extLst>
+            </p:cNvPr>
+            <p:cNvSpPr txBox="1"/>
+            <p:nvPr/>
+          </p:nvSpPr>
+          <p:spPr>
+            <a:xfrm rot="16200000">
+              <a:off x="4101251" y="2736692"/>
+              <a:ext cx="1108830" cy="400110"/>
+            </a:xfrm>
+            <a:prstGeom prst="rect">
+              <a:avLst/>
+            </a:prstGeom>
+            <a:noFill/>
+          </p:spPr>
+          <p:txBody>
+            <a:bodyPr wrap="none" rtlCol="0">
+              <a:spAutoFit/>
+            </a:bodyPr>
+            <a:lstStyle/>
+            <a:p>
+              <a:r>
+                <a:rPr lang="en-US" sz="2000" dirty="0"/>
+                <a:t>Innocent</a:t>
+              </a:r>
+            </a:p>
+          </p:txBody>
+        </p:sp>
+        <p:sp>
+          <p:nvSpPr>
+            <p:cNvPr id="18" name="TextBox 17">
+              <a:extLst>
+                <a:ext uri="{FF2B5EF4-FFF2-40B4-BE49-F238E27FC236}">
+                  <a16:creationId xmlns:a16="http://schemas.microsoft.com/office/drawing/2014/main" id="{59723384-8522-4015-ADC8-A429EBA5844D}"/>
+                </a:ext>
+              </a:extLst>
+            </p:cNvPr>
+            <p:cNvSpPr txBox="1"/>
+            <p:nvPr/>
+          </p:nvSpPr>
+          <p:spPr>
+            <a:xfrm rot="16200000">
+              <a:off x="4156972" y="4782018"/>
+              <a:ext cx="997389" cy="400110"/>
+            </a:xfrm>
+            <a:prstGeom prst="rect">
+              <a:avLst/>
+            </a:prstGeom>
+            <a:noFill/>
+          </p:spPr>
+          <p:txBody>
+            <a:bodyPr wrap="none" rtlCol="0">
+              <a:spAutoFit/>
+            </a:bodyPr>
+            <a:lstStyle/>
+            <a:p>
+              <a:r>
+                <a:rPr lang="en-US" sz="2000" dirty="0"/>
+                <a:t>Suspect</a:t>
+              </a:r>
+            </a:p>
+          </p:txBody>
+        </p:sp>
+        <p:cxnSp>
+          <p:nvCxnSpPr>
+            <p:cNvPr id="8" name="Straight Connector 7">
+              <a:extLst>
+                <a:ext uri="{FF2B5EF4-FFF2-40B4-BE49-F238E27FC236}">
+                  <a16:creationId xmlns:a16="http://schemas.microsoft.com/office/drawing/2014/main" id="{4D9FC498-E1DA-4770-9766-EB23D4F76DD3}"/>
+                </a:ext>
+              </a:extLst>
+            </p:cNvPr>
+            <p:cNvCxnSpPr/>
+            <p:nvPr/>
+          </p:nvCxnSpPr>
+          <p:spPr>
+            <a:xfrm>
+              <a:off x="4876243" y="1511777"/>
+              <a:ext cx="4090655" cy="0"/>
+            </a:xfrm>
+            <a:prstGeom prst="line">
+              <a:avLst/>
+            </a:prstGeom>
+            <a:ln>
+              <a:solidFill>
+                <a:schemeClr val="tx1"/>
+              </a:solidFill>
+            </a:ln>
+          </p:spPr>
+          <p:style>
+            <a:lnRef idx="1">
+              <a:schemeClr val="accent1"/>
+            </a:lnRef>
+            <a:fillRef idx="0">
+              <a:schemeClr val="accent1"/>
+            </a:fillRef>
+            <a:effectRef idx="0">
+              <a:schemeClr val="accent1"/>
+            </a:effectRef>
+            <a:fontRef idx="minor">
+              <a:schemeClr val="tx1"/>
+            </a:fontRef>
+          </p:style>
+        </p:cxnSp>
+        <p:cxnSp>
+          <p:nvCxnSpPr>
+            <p:cNvPr id="19" name="Straight Connector 18">
+              <a:extLst>
+                <a:ext uri="{FF2B5EF4-FFF2-40B4-BE49-F238E27FC236}">
+                  <a16:creationId xmlns:a16="http://schemas.microsoft.com/office/drawing/2014/main" id="{5CADEE52-AFFF-4C04-88D2-F8EBEFE47E27}"/>
+                </a:ext>
+              </a:extLst>
+            </p:cNvPr>
+            <p:cNvCxnSpPr>
+              <a:cxnSpLocks/>
+            </p:cNvCxnSpPr>
+            <p:nvPr/>
+          </p:nvCxnSpPr>
+          <p:spPr>
+            <a:xfrm>
+              <a:off x="4425950" y="1912619"/>
+              <a:ext cx="0" cy="4092118"/>
+            </a:xfrm>
+            <a:prstGeom prst="line">
+              <a:avLst/>
+            </a:prstGeom>
+            <a:ln>
+              <a:solidFill>
+                <a:schemeClr val="tx1"/>
+              </a:solidFill>
+            </a:ln>
+          </p:spPr>
+          <p:style>
+            <a:lnRef idx="1">
+              <a:schemeClr val="accent1"/>
+            </a:lnRef>
+            <a:fillRef idx="0">
+              <a:schemeClr val="accent1"/>
+            </a:fillRef>
+            <a:effectRef idx="0">
+              <a:schemeClr val="accent1"/>
+            </a:effectRef>
+            <a:fontRef idx="minor">
+              <a:schemeClr val="tx1"/>
+            </a:fontRef>
+          </p:style>
+        </p:cxnSp>
       </p:grpSp>
-      <p:sp>
-        <p:nvSpPr>
-          <p:cNvPr id="14" name="TextBox 13">
-            <a:extLst>
-              <a:ext uri="{FF2B5EF4-FFF2-40B4-BE49-F238E27FC236}">
-                <a16:creationId xmlns:a16="http://schemas.microsoft.com/office/drawing/2014/main" id="{CCF559ED-6D24-4FD1-BF19-4D49C328F260}"/>
-              </a:ext>
-            </a:extLst>
-          </p:cNvPr>
-          <p:cNvSpPr txBox="1"/>
-          <p:nvPr/>
-        </p:nvSpPr>
-        <p:spPr>
-          <a:xfrm>
-            <a:off x="7001844" y="1547020"/>
-            <a:ext cx="1108830" cy="400110"/>
-          </a:xfrm>
-          <a:prstGeom prst="rect">
-            <a:avLst/>
-          </a:prstGeom>
-          <a:noFill/>
-        </p:spPr>
-        <p:txBody>
-          <a:bodyPr wrap="none" rtlCol="0">
-            <a:spAutoFit/>
-          </a:bodyPr>
-          <a:lstStyle/>
-          <a:p>
-            <a:r>
-              <a:rPr lang="en-US" sz="2000" dirty="0"/>
-              <a:t>Innocent</a:t>
-            </a:r>
-          </a:p>
-        </p:txBody>
-      </p:sp>
-      <p:sp>
-        <p:nvSpPr>
-          <p:cNvPr id="15" name="TextBox 14">
-            <a:extLst>
-              <a:ext uri="{FF2B5EF4-FFF2-40B4-BE49-F238E27FC236}">
-                <a16:creationId xmlns:a16="http://schemas.microsoft.com/office/drawing/2014/main" id="{6713A818-0379-408A-892E-D0E8B8A2B578}"/>
-              </a:ext>
-            </a:extLst>
-          </p:cNvPr>
-          <p:cNvSpPr txBox="1"/>
-          <p:nvPr/>
-        </p:nvSpPr>
-        <p:spPr>
-          <a:xfrm>
-            <a:off x="9102891" y="1547020"/>
-            <a:ext cx="997389" cy="400110"/>
-          </a:xfrm>
-          <a:prstGeom prst="rect">
-            <a:avLst/>
-          </a:prstGeom>
-          <a:noFill/>
-        </p:spPr>
-        <p:txBody>
-          <a:bodyPr wrap="none" rtlCol="0">
-            <a:spAutoFit/>
-          </a:bodyPr>
-          <a:lstStyle/>
-          <a:p>
-            <a:r>
-              <a:rPr lang="en-US" sz="2000" dirty="0"/>
-              <a:t>Suspect</a:t>
-            </a:r>
-          </a:p>
-        </p:txBody>
-      </p:sp>
-      <p:sp>
-        <p:nvSpPr>
-          <p:cNvPr id="16" name="TextBox 15">
-            <a:extLst>
-              <a:ext uri="{FF2B5EF4-FFF2-40B4-BE49-F238E27FC236}">
-                <a16:creationId xmlns:a16="http://schemas.microsoft.com/office/drawing/2014/main" id="{A7445275-7DD0-4938-9F89-183418010E75}"/>
-              </a:ext>
-            </a:extLst>
-          </p:cNvPr>
-          <p:cNvSpPr txBox="1"/>
-          <p:nvPr/>
-        </p:nvSpPr>
-        <p:spPr>
-          <a:xfrm>
-            <a:off x="7840910" y="1159281"/>
-            <a:ext cx="1760675" cy="400110"/>
-          </a:xfrm>
-          <a:prstGeom prst="rect">
-            <a:avLst/>
-          </a:prstGeom>
-          <a:noFill/>
-        </p:spPr>
-        <p:txBody>
-          <a:bodyPr wrap="none" rtlCol="0">
-            <a:spAutoFit/>
-          </a:bodyPr>
-          <a:lstStyle/>
-          <a:p>
-            <a:r>
-              <a:rPr lang="en-US" sz="2000" dirty="0"/>
-              <a:t>Predicted Class</a:t>
-            </a:r>
-          </a:p>
-        </p:txBody>
-      </p:sp>
-      <p:sp>
-        <p:nvSpPr>
-          <p:cNvPr id="17" name="TextBox 16">
-            <a:extLst>
-              <a:ext uri="{FF2B5EF4-FFF2-40B4-BE49-F238E27FC236}">
-                <a16:creationId xmlns:a16="http://schemas.microsoft.com/office/drawing/2014/main" id="{E7672CAB-B348-41EF-B228-548B508E4356}"/>
-              </a:ext>
-            </a:extLst>
-          </p:cNvPr>
-          <p:cNvSpPr txBox="1"/>
-          <p:nvPr/>
-        </p:nvSpPr>
-        <p:spPr>
-          <a:xfrm>
-            <a:off x="5367203" y="2878906"/>
-            <a:ext cx="1108830" cy="400110"/>
-          </a:xfrm>
-          <a:prstGeom prst="rect">
-            <a:avLst/>
-          </a:prstGeom>
-          <a:noFill/>
-        </p:spPr>
-        <p:txBody>
-          <a:bodyPr wrap="none" rtlCol="0">
-            <a:spAutoFit/>
-          </a:bodyPr>
-          <a:lstStyle/>
-          <a:p>
-            <a:r>
-              <a:rPr lang="en-US" sz="2000" dirty="0"/>
-              <a:t>Innocent</a:t>
-            </a:r>
-          </a:p>
-        </p:txBody>
-      </p:sp>
-      <p:sp>
-        <p:nvSpPr>
-          <p:cNvPr id="18" name="TextBox 17">
-            <a:extLst>
-              <a:ext uri="{FF2B5EF4-FFF2-40B4-BE49-F238E27FC236}">
-                <a16:creationId xmlns:a16="http://schemas.microsoft.com/office/drawing/2014/main" id="{59723384-8522-4015-ADC8-A429EBA5844D}"/>
-              </a:ext>
-            </a:extLst>
-          </p:cNvPr>
-          <p:cNvSpPr txBox="1"/>
-          <p:nvPr/>
-        </p:nvSpPr>
-        <p:spPr>
-          <a:xfrm>
-            <a:off x="5478644" y="4985213"/>
-            <a:ext cx="997389" cy="400110"/>
-          </a:xfrm>
-          <a:prstGeom prst="rect">
-            <a:avLst/>
-          </a:prstGeom>
-          <a:noFill/>
-        </p:spPr>
-        <p:txBody>
-          <a:bodyPr wrap="none" rtlCol="0">
-            <a:spAutoFit/>
-          </a:bodyPr>
-          <a:lstStyle/>
-          <a:p>
-            <a:r>
-              <a:rPr lang="en-US" sz="2000" dirty="0"/>
-              <a:t>Suspect</a:t>
-            </a:r>
-          </a:p>
-        </p:txBody>
-      </p:sp>
     </p:spTree>
     <p:extLst>
       <p:ext uri="{BB962C8B-B14F-4D97-AF65-F5344CB8AC3E}">
@@ -21613,180 +21821,199 @@
           </a:fontRef>
         </p:style>
       </p:cxnSp>
-      <p:sp>
-        <p:nvSpPr>
-          <p:cNvPr id="7" name="TextBox 6">
+      <p:grpSp>
+        <p:nvGrpSpPr>
+          <p:cNvPr id="4" name="Group 3">
             <a:extLst>
               <a:ext uri="{FF2B5EF4-FFF2-40B4-BE49-F238E27FC236}">
-                <a16:creationId xmlns:a16="http://schemas.microsoft.com/office/drawing/2014/main" id="{84ED6747-7DD6-43FD-9C6E-3EE662AF7197}"/>
+                <a16:creationId xmlns:a16="http://schemas.microsoft.com/office/drawing/2014/main" id="{F7D771EF-4783-4FF8-92A2-43E169A75C9B}"/>
               </a:ext>
             </a:extLst>
           </p:cNvPr>
-          <p:cNvSpPr txBox="1"/>
+          <p:cNvGrpSpPr/>
           <p:nvPr/>
-        </p:nvSpPr>
-        <p:spPr>
+        </p:nvGrpSpPr>
+        <p:grpSpPr>
           <a:xfrm>
-            <a:off x="1092312" y="1192100"/>
-            <a:ext cx="4449763" cy="660208"/>
+            <a:off x="1283234" y="1345778"/>
+            <a:ext cx="7952975" cy="4832185"/>
+            <a:chOff x="1283234" y="1345778"/>
+            <a:chExt cx="7952975" cy="4832185"/>
           </a:xfrm>
-          <a:prstGeom prst="rect">
-            <a:avLst/>
-          </a:prstGeom>
-          <a:solidFill>
-            <a:srgbClr val="000000">
-              <a:alpha val="50000"/>
-            </a:srgbClr>
-          </a:solidFill>
-          <a:ln>
-            <a:noFill/>
-          </a:ln>
-        </p:spPr>
-        <p:txBody>
-          <a:bodyPr wrap="square" rtlCol="0" anchor="ctr">
-            <a:noAutofit/>
-          </a:bodyPr>
-          <a:lstStyle/>
-          <a:p>
-            <a:pPr algn="ctr">
-              <a:spcAft>
-                <a:spcPts val="600"/>
-              </a:spcAft>
-            </a:pPr>
-            <a:r>
-              <a:rPr lang="en-US" sz="2800" dirty="0">
-                <a:solidFill>
-                  <a:srgbClr val="FFFFFF"/>
-                </a:solidFill>
-              </a:rPr>
-              <a:t>Inpatient Claims</a:t>
-            </a:r>
-          </a:p>
-        </p:txBody>
-      </p:sp>
-      <p:sp>
-        <p:nvSpPr>
-          <p:cNvPr id="9" name="TextBox 8">
-            <a:extLst>
-              <a:ext uri="{FF2B5EF4-FFF2-40B4-BE49-F238E27FC236}">
-                <a16:creationId xmlns:a16="http://schemas.microsoft.com/office/drawing/2014/main" id="{780616CD-127A-4C3B-9D0C-1631592ACF52}"/>
-              </a:ext>
-            </a:extLst>
-          </p:cNvPr>
-          <p:cNvSpPr txBox="1"/>
-          <p:nvPr/>
-        </p:nvSpPr>
-        <p:spPr>
-          <a:xfrm>
-            <a:off x="6705917" y="1192100"/>
-            <a:ext cx="4449763" cy="660208"/>
-          </a:xfrm>
-          <a:prstGeom prst="rect">
-            <a:avLst/>
-          </a:prstGeom>
-          <a:solidFill>
-            <a:srgbClr val="000000">
-              <a:alpha val="50000"/>
-            </a:srgbClr>
-          </a:solidFill>
-          <a:ln>
-            <a:noFill/>
-          </a:ln>
-        </p:spPr>
-        <p:txBody>
-          <a:bodyPr wrap="square" rtlCol="0" anchor="ctr">
-            <a:noAutofit/>
-          </a:bodyPr>
-          <a:lstStyle/>
-          <a:p>
-            <a:pPr algn="ctr">
-              <a:spcAft>
-                <a:spcPts val="600"/>
-              </a:spcAft>
-            </a:pPr>
-            <a:r>
-              <a:rPr lang="en-US" sz="2800" dirty="0">
-                <a:solidFill>
-                  <a:srgbClr val="FFFFFF"/>
-                </a:solidFill>
-              </a:rPr>
-              <a:t>Outpatient Claims</a:t>
-            </a:r>
-          </a:p>
-        </p:txBody>
-      </p:sp>
-      <p:pic>
-        <p:nvPicPr>
-          <p:cNvPr id="10" name="Content Placeholder 4" descr="Schematic&#10;&#10;Description automatically generated with medium confidence">
-            <a:extLst>
-              <a:ext uri="{FF2B5EF4-FFF2-40B4-BE49-F238E27FC236}">
-                <a16:creationId xmlns:a16="http://schemas.microsoft.com/office/drawing/2014/main" id="{2A637CB1-2AE0-47BC-9D42-7D3A08E9E416}"/>
-              </a:ext>
-            </a:extLst>
-          </p:cNvPr>
-          <p:cNvPicPr>
-            <a:picLocks noChangeAspect="1"/>
-          </p:cNvPicPr>
-          <p:nvPr/>
-        </p:nvPicPr>
-        <p:blipFill>
-          <a:blip r:embed="rId2">
-            <a:extLst>
-              <a:ext uri="{28A0092B-C50C-407E-A947-70E740481C1C}">
-                <a14:useLocalDpi xmlns:a14="http://schemas.microsoft.com/office/drawing/2010/main" val="0"/>
-              </a:ext>
-            </a:extLst>
-          </a:blip>
-          <a:stretch>
-            <a:fillRect/>
-          </a:stretch>
-        </p:blipFill>
-        <p:spPr>
-          <a:xfrm>
-            <a:off x="968941" y="1997927"/>
-            <a:ext cx="4696504" cy="4696504"/>
-          </a:xfrm>
-          <a:prstGeom prst="rect">
-            <a:avLst/>
-          </a:prstGeom>
-        </p:spPr>
-      </p:pic>
-      <p:pic>
-        <p:nvPicPr>
-          <p:cNvPr id="11" name="Picture 10" descr="Chart&#10;&#10;Description automatically generated with low confidence">
-            <a:extLst>
-              <a:ext uri="{FF2B5EF4-FFF2-40B4-BE49-F238E27FC236}">
-                <a16:creationId xmlns:a16="http://schemas.microsoft.com/office/drawing/2014/main" id="{B601747C-F26B-484C-B024-D1E69A3110B6}"/>
-              </a:ext>
-            </a:extLst>
-          </p:cNvPr>
-          <p:cNvPicPr>
-            <a:picLocks noChangeAspect="1"/>
-          </p:cNvPicPr>
-          <p:nvPr/>
-        </p:nvPicPr>
-        <p:blipFill>
-          <a:blip r:embed="rId3">
-            <a:extLst>
-              <a:ext uri="{28A0092B-C50C-407E-A947-70E740481C1C}">
-                <a14:useLocalDpi xmlns:a14="http://schemas.microsoft.com/office/drawing/2010/main" val="0"/>
-              </a:ext>
-            </a:extLst>
-          </a:blip>
-          <a:stretch>
-            <a:fillRect/>
-          </a:stretch>
-        </p:blipFill>
-        <p:spPr>
-          <a:xfrm>
-            <a:off x="6582545" y="1945842"/>
-            <a:ext cx="4696505" cy="4696505"/>
-          </a:xfrm>
-          <a:prstGeom prst="rect">
-            <a:avLst/>
-          </a:prstGeom>
-        </p:spPr>
-      </p:pic>
+        </p:grpSpPr>
+        <p:sp>
+          <p:nvSpPr>
+            <p:cNvPr id="7" name="TextBox 6">
+              <a:extLst>
+                <a:ext uri="{FF2B5EF4-FFF2-40B4-BE49-F238E27FC236}">
+                  <a16:creationId xmlns:a16="http://schemas.microsoft.com/office/drawing/2014/main" id="{84ED6747-7DD6-43FD-9C6E-3EE662AF7197}"/>
+                </a:ext>
+              </a:extLst>
+            </p:cNvPr>
+            <p:cNvSpPr txBox="1"/>
+            <p:nvPr/>
+          </p:nvSpPr>
+          <p:spPr>
+            <a:xfrm>
+              <a:off x="1283234" y="1345778"/>
+              <a:ext cx="4029857" cy="660208"/>
+            </a:xfrm>
+            <a:prstGeom prst="rect">
+              <a:avLst/>
+            </a:prstGeom>
+            <a:solidFill>
+              <a:srgbClr val="000000">
+                <a:alpha val="50000"/>
+              </a:srgbClr>
+            </a:solidFill>
+            <a:ln>
+              <a:noFill/>
+            </a:ln>
+          </p:spPr>
+          <p:txBody>
+            <a:bodyPr wrap="square" rtlCol="0" anchor="ctr">
+              <a:noAutofit/>
+            </a:bodyPr>
+            <a:lstStyle/>
+            <a:p>
+              <a:pPr algn="ctr">
+                <a:spcAft>
+                  <a:spcPts val="600"/>
+                </a:spcAft>
+              </a:pPr>
+              <a:r>
+                <a:rPr lang="en-US" sz="2800" dirty="0">
+                  <a:solidFill>
+                    <a:srgbClr val="FFFFFF"/>
+                  </a:solidFill>
+                </a:rPr>
+                <a:t>Inpatient Claims</a:t>
+              </a:r>
+            </a:p>
+          </p:txBody>
+        </p:sp>
+        <p:sp>
+          <p:nvSpPr>
+            <p:cNvPr id="9" name="TextBox 8">
+              <a:extLst>
+                <a:ext uri="{FF2B5EF4-FFF2-40B4-BE49-F238E27FC236}">
+                  <a16:creationId xmlns:a16="http://schemas.microsoft.com/office/drawing/2014/main" id="{780616CD-127A-4C3B-9D0C-1631592ACF52}"/>
+                </a:ext>
+              </a:extLst>
+            </p:cNvPr>
+            <p:cNvSpPr txBox="1"/>
+            <p:nvPr/>
+          </p:nvSpPr>
+          <p:spPr>
+            <a:xfrm>
+              <a:off x="5313091" y="1345778"/>
+              <a:ext cx="3923118" cy="660208"/>
+            </a:xfrm>
+            <a:prstGeom prst="rect">
+              <a:avLst/>
+            </a:prstGeom>
+            <a:solidFill>
+              <a:srgbClr val="000000">
+                <a:alpha val="50000"/>
+              </a:srgbClr>
+            </a:solidFill>
+            <a:ln>
+              <a:noFill/>
+            </a:ln>
+          </p:spPr>
+          <p:txBody>
+            <a:bodyPr wrap="square" rtlCol="0" anchor="ctr">
+              <a:noAutofit/>
+            </a:bodyPr>
+            <a:lstStyle/>
+            <a:p>
+              <a:pPr algn="ctr">
+                <a:spcAft>
+                  <a:spcPts val="600"/>
+                </a:spcAft>
+              </a:pPr>
+              <a:r>
+                <a:rPr lang="en-US" sz="2800" dirty="0">
+                  <a:solidFill>
+                    <a:srgbClr val="FFFFFF"/>
+                  </a:solidFill>
+                </a:rPr>
+                <a:t>Outpatient Claims</a:t>
+              </a:r>
+            </a:p>
+          </p:txBody>
+        </p:sp>
+        <p:pic>
+          <p:nvPicPr>
+            <p:cNvPr id="10" name="Content Placeholder 4" descr="Schematic&#10;&#10;Description automatically generated with medium confidence">
+              <a:extLst>
+                <a:ext uri="{FF2B5EF4-FFF2-40B4-BE49-F238E27FC236}">
+                  <a16:creationId xmlns:a16="http://schemas.microsoft.com/office/drawing/2014/main" id="{2A637CB1-2AE0-47BC-9D42-7D3A08E9E416}"/>
+                </a:ext>
+              </a:extLst>
+            </p:cNvPr>
+            <p:cNvPicPr>
+              <a:picLocks noChangeAspect="1"/>
+            </p:cNvPicPr>
+            <p:nvPr/>
+          </p:nvPicPr>
+          <p:blipFill rotWithShape="1">
+            <a:blip r:embed="rId2">
+              <a:extLst>
+                <a:ext uri="{28A0092B-C50C-407E-A947-70E740481C1C}">
+                  <a14:useLocalDpi xmlns:a14="http://schemas.microsoft.com/office/drawing/2010/main" val="0"/>
+                </a:ext>
+              </a:extLst>
+            </a:blip>
+            <a:srcRect l="6692" r="7501" b="10997"/>
+            <a:stretch/>
+          </p:blipFill>
+          <p:spPr>
+            <a:xfrm>
+              <a:off x="1283234" y="1997927"/>
+              <a:ext cx="4029858" cy="4180036"/>
+            </a:xfrm>
+            <a:prstGeom prst="rect">
+              <a:avLst/>
+            </a:prstGeom>
+          </p:spPr>
+        </p:pic>
+        <p:pic>
+          <p:nvPicPr>
+            <p:cNvPr id="11" name="Picture 10" descr="Chart&#10;&#10;Description automatically generated with low confidence">
+              <a:extLst>
+                <a:ext uri="{FF2B5EF4-FFF2-40B4-BE49-F238E27FC236}">
+                  <a16:creationId xmlns:a16="http://schemas.microsoft.com/office/drawing/2014/main" id="{B601747C-F26B-484C-B024-D1E69A3110B6}"/>
+                </a:ext>
+              </a:extLst>
+            </p:cNvPr>
+            <p:cNvPicPr>
+              <a:picLocks noChangeAspect="1"/>
+            </p:cNvPicPr>
+            <p:nvPr/>
+          </p:nvPicPr>
+          <p:blipFill rotWithShape="1">
+            <a:blip r:embed="rId3">
+              <a:extLst>
+                <a:ext uri="{28A0092B-C50C-407E-A947-70E740481C1C}">
+                  <a14:useLocalDpi xmlns:a14="http://schemas.microsoft.com/office/drawing/2010/main" val="0"/>
+                </a:ext>
+              </a:extLst>
+            </a:blip>
+            <a:srcRect l="6692" r="7502" b="10997"/>
+            <a:stretch/>
+          </p:blipFill>
+          <p:spPr>
+            <a:xfrm>
+              <a:off x="5206351" y="1997926"/>
+              <a:ext cx="4029858" cy="4180037"/>
+            </a:xfrm>
+            <a:prstGeom prst="rect">
+              <a:avLst/>
+            </a:prstGeom>
+          </p:spPr>
+        </p:pic>
+      </p:grpSp>
     </p:spTree>
     <p:extLst>
       <p:ext uri="{BB962C8B-B14F-4D97-AF65-F5344CB8AC3E}">

</xml_diff>